<commit_message>
Import avant remplacement de la démo avec les angles d'Euler
</commit_message>
<xml_diff>
--- a/05_CinematiqueDuSolide/Cours/png/Figure.pptx
+++ b/05_CinematiqueDuSolide/Cours/png/Figure.pptx
@@ -5,21 +5,22 @@
     <p:sldMasterId id="2147483648" r:id="rId1"/>
   </p:sldMasterIdLst>
   <p:notesMasterIdLst>
-    <p:notesMasterId r:id="rId14"/>
+    <p:notesMasterId r:id="rId15"/>
   </p:notesMasterIdLst>
   <p:sldIdLst>
-    <p:sldId id="256" r:id="rId2"/>
-    <p:sldId id="257" r:id="rId3"/>
-    <p:sldId id="258" r:id="rId4"/>
-    <p:sldId id="266" r:id="rId5"/>
-    <p:sldId id="259" r:id="rId6"/>
-    <p:sldId id="261" r:id="rId7"/>
-    <p:sldId id="262" r:id="rId8"/>
-    <p:sldId id="263" r:id="rId9"/>
-    <p:sldId id="264" r:id="rId10"/>
-    <p:sldId id="260" r:id="rId11"/>
-    <p:sldId id="265" r:id="rId12"/>
-    <p:sldId id="267" r:id="rId13"/>
+    <p:sldId id="268" r:id="rId2"/>
+    <p:sldId id="256" r:id="rId3"/>
+    <p:sldId id="257" r:id="rId4"/>
+    <p:sldId id="258" r:id="rId5"/>
+    <p:sldId id="266" r:id="rId6"/>
+    <p:sldId id="259" r:id="rId7"/>
+    <p:sldId id="261" r:id="rId8"/>
+    <p:sldId id="262" r:id="rId9"/>
+    <p:sldId id="263" r:id="rId10"/>
+    <p:sldId id="264" r:id="rId11"/>
+    <p:sldId id="260" r:id="rId12"/>
+    <p:sldId id="265" r:id="rId13"/>
+    <p:sldId id="267" r:id="rId14"/>
   </p:sldIdLst>
   <p:sldSz cx="9144000" cy="6858000" type="screen4x3"/>
   <p:notesSz cx="6858000" cy="9144000"/>
@@ -536,7 +537,7 @@
           <a:p>
             <a:fld id="{0BF3E7C8-9289-40BF-9B14-B9B1AE5AE804}" type="slidenum">
               <a:rPr lang="fr-FR" smtClean="0"/>
-              <a:t>3</a:t>
+              <a:t>4</a:t>
             </a:fld>
             <a:endParaRPr lang="fr-FR"/>
           </a:p>
@@ -620,7 +621,7 @@
           <a:p>
             <a:fld id="{0BF3E7C8-9289-40BF-9B14-B9B1AE5AE804}" type="slidenum">
               <a:rPr lang="fr-FR" smtClean="0"/>
-              <a:t>4</a:t>
+              <a:t>5</a:t>
             </a:fld>
             <a:endParaRPr lang="fr-FR"/>
           </a:p>
@@ -3627,40 +3628,1895 @@
           <a:chExt cx="0" cy="0"/>
         </a:xfrm>
       </p:grpSpPr>
-      <p:pic>
-        <p:nvPicPr>
-          <p:cNvPr id="4" name="Image 3"/>
-          <p:cNvPicPr>
-            <a:picLocks noChangeAspect="1"/>
-          </p:cNvPicPr>
+      <p:cxnSp>
+        <p:nvCxnSpPr>
+          <p:cNvPr id="4" name="Connecteur droit avec flèche 3"/>
+          <p:cNvCxnSpPr/>
           <p:nvPr/>
-        </p:nvPicPr>
-        <p:blipFill>
-          <a:blip r:embed="rId2">
-            <a:extLst>
-              <a:ext uri="{28A0092B-C50C-407E-A947-70E740481C1C}">
-                <a14:useLocalDpi xmlns:a14="http://schemas.microsoft.com/office/drawing/2010/main" val="0"/>
-              </a:ext>
-            </a:extLst>
-          </a:blip>
-          <a:stretch>
-            <a:fillRect/>
-          </a:stretch>
-        </p:blipFill>
+        </p:nvCxnSpPr>
         <p:spPr>
           <a:xfrm>
-            <a:off x="2572000" y="679793"/>
-            <a:ext cx="4000000" cy="5498413"/>
+            <a:off x="961008" y="2705509"/>
+            <a:ext cx="1440160" cy="0"/>
+          </a:xfrm>
+          <a:prstGeom prst="straightConnector1">
+            <a:avLst/>
+          </a:prstGeom>
+          <a:ln w="28575">
+            <a:tailEnd type="stealth" w="med" len="lg"/>
+          </a:ln>
+        </p:spPr>
+        <p:style>
+          <a:lnRef idx="1">
+            <a:schemeClr val="accent1"/>
+          </a:lnRef>
+          <a:fillRef idx="0">
+            <a:schemeClr val="accent1"/>
+          </a:fillRef>
+          <a:effectRef idx="0">
+            <a:schemeClr val="accent1"/>
+          </a:effectRef>
+          <a:fontRef idx="minor">
+            <a:schemeClr val="tx1"/>
+          </a:fontRef>
+        </p:style>
+      </p:cxnSp>
+      <p:cxnSp>
+        <p:nvCxnSpPr>
+          <p:cNvPr id="5" name="Connecteur droit avec flèche 4"/>
+          <p:cNvCxnSpPr/>
+          <p:nvPr/>
+        </p:nvCxnSpPr>
+        <p:spPr>
+          <a:xfrm flipV="1">
+            <a:off x="961008" y="1265350"/>
+            <a:ext cx="0" cy="1440160"/>
+          </a:xfrm>
+          <a:prstGeom prst="straightConnector1">
+            <a:avLst/>
+          </a:prstGeom>
+          <a:ln w="28575">
+            <a:tailEnd type="stealth" w="med" len="lg"/>
+          </a:ln>
+        </p:spPr>
+        <p:style>
+          <a:lnRef idx="1">
+            <a:schemeClr val="accent1"/>
+          </a:lnRef>
+          <a:fillRef idx="0">
+            <a:schemeClr val="accent1"/>
+          </a:fillRef>
+          <a:effectRef idx="0">
+            <a:schemeClr val="accent1"/>
+          </a:effectRef>
+          <a:fontRef idx="minor">
+            <a:schemeClr val="tx1"/>
+          </a:fontRef>
+        </p:style>
+      </p:cxnSp>
+      <p:grpSp>
+        <p:nvGrpSpPr>
+          <p:cNvPr id="8" name="Groupe 7"/>
+          <p:cNvGrpSpPr/>
+          <p:nvPr/>
+        </p:nvGrpSpPr>
+        <p:grpSpPr>
+          <a:xfrm rot="19800000">
+            <a:off x="504496" y="1001781"/>
+            <a:ext cx="1440160" cy="1440160"/>
+            <a:chOff x="6732240" y="1268762"/>
+            <a:chExt cx="1440160" cy="1440160"/>
+          </a:xfrm>
+        </p:grpSpPr>
+        <p:cxnSp>
+          <p:nvCxnSpPr>
+            <p:cNvPr id="9" name="Connecteur droit avec flèche 8"/>
+            <p:cNvCxnSpPr/>
+            <p:nvPr/>
+          </p:nvCxnSpPr>
+          <p:spPr>
+            <a:xfrm>
+              <a:off x="6732240" y="2708921"/>
+              <a:ext cx="1440160" cy="0"/>
+            </a:xfrm>
+            <a:prstGeom prst="straightConnector1">
+              <a:avLst/>
+            </a:prstGeom>
+            <a:ln w="28575">
+              <a:solidFill>
+                <a:srgbClr val="7030A0"/>
+              </a:solidFill>
+              <a:tailEnd type="stealth" w="med" len="lg"/>
+            </a:ln>
+          </p:spPr>
+          <p:style>
+            <a:lnRef idx="1">
+              <a:schemeClr val="accent1"/>
+            </a:lnRef>
+            <a:fillRef idx="0">
+              <a:schemeClr val="accent1"/>
+            </a:fillRef>
+            <a:effectRef idx="0">
+              <a:schemeClr val="accent1"/>
+            </a:effectRef>
+            <a:fontRef idx="minor">
+              <a:schemeClr val="tx1"/>
+            </a:fontRef>
+          </p:style>
+        </p:cxnSp>
+        <p:cxnSp>
+          <p:nvCxnSpPr>
+            <p:cNvPr id="10" name="Connecteur droit avec flèche 9"/>
+            <p:cNvCxnSpPr/>
+            <p:nvPr/>
+          </p:nvCxnSpPr>
+          <p:spPr>
+            <a:xfrm flipV="1">
+              <a:off x="6732240" y="1268762"/>
+              <a:ext cx="0" cy="1440160"/>
+            </a:xfrm>
+            <a:prstGeom prst="straightConnector1">
+              <a:avLst/>
+            </a:prstGeom>
+            <a:ln w="28575">
+              <a:solidFill>
+                <a:srgbClr val="7030A0"/>
+              </a:solidFill>
+              <a:tailEnd type="stealth" w="med" len="lg"/>
+            </a:ln>
+          </p:spPr>
+          <p:style>
+            <a:lnRef idx="1">
+              <a:schemeClr val="accent1"/>
+            </a:lnRef>
+            <a:fillRef idx="0">
+              <a:schemeClr val="accent1"/>
+            </a:fillRef>
+            <a:effectRef idx="0">
+              <a:schemeClr val="accent1"/>
+            </a:effectRef>
+            <a:fontRef idx="minor">
+              <a:schemeClr val="tx1"/>
+            </a:fontRef>
+          </p:style>
+        </p:cxnSp>
+      </p:grpSp>
+      <p:sp>
+        <p:nvSpPr>
+          <p:cNvPr id="11" name="ZoneTexte 10"/>
+          <p:cNvSpPr txBox="1">
+            <a:spLocks noRot="1" noChangeAspect="1" noMove="1" noResize="1" noEditPoints="1" noAdjustHandles="1" noChangeArrowheads="1" noChangeShapeType="1" noTextEdit="1"/>
+          </p:cNvSpPr>
+          <p:nvPr/>
+        </p:nvSpPr>
+        <p:spPr>
+          <a:xfrm>
+            <a:off x="2060503" y="1723624"/>
+            <a:ext cx="353365" cy="338554"/>
           </a:xfrm>
           <a:prstGeom prst="rect">
             <a:avLst/>
           </a:prstGeom>
+          <a:blipFill rotWithShape="1">
+            <a:blip r:embed="rId2"/>
+            <a:stretch>
+              <a:fillRect/>
+            </a:stretch>
+          </a:blipFill>
         </p:spPr>
-      </p:pic>
+        <p:txBody>
+          <a:bodyPr/>
+          <a:lstStyle/>
+          <a:p>
+            <a:r>
+              <a:rPr lang="fr-FR">
+                <a:noFill/>
+              </a:rPr>
+              <a:t> </a:t>
+            </a:r>
+          </a:p>
+        </p:txBody>
+      </p:sp>
+      <p:sp>
+        <p:nvSpPr>
+          <p:cNvPr id="12" name="ZoneTexte 11"/>
+          <p:cNvSpPr txBox="1">
+            <a:spLocks noRot="1" noChangeAspect="1" noMove="1" noResize="1" noEditPoints="1" noAdjustHandles="1" noChangeArrowheads="1" noChangeShapeType="1" noTextEdit="1"/>
+          </p:cNvSpPr>
+          <p:nvPr/>
+        </p:nvSpPr>
+        <p:spPr>
+          <a:xfrm>
+            <a:off x="163394" y="1195870"/>
+            <a:ext cx="349390" cy="338554"/>
+          </a:xfrm>
+          <a:prstGeom prst="rect">
+            <a:avLst/>
+          </a:prstGeom>
+          <a:blipFill rotWithShape="1">
+            <a:blip r:embed="rId3"/>
+            <a:stretch>
+              <a:fillRect t="-14286" r="-19298"/>
+            </a:stretch>
+          </a:blipFill>
+        </p:spPr>
+        <p:txBody>
+          <a:bodyPr/>
+          <a:lstStyle/>
+          <a:p>
+            <a:r>
+              <a:rPr lang="fr-FR">
+                <a:noFill/>
+              </a:rPr>
+              <a:t> </a:t>
+            </a:r>
+          </a:p>
+        </p:txBody>
+      </p:sp>
+      <p:sp>
+        <p:nvSpPr>
+          <p:cNvPr id="13" name="ZoneTexte 12"/>
+          <p:cNvSpPr txBox="1">
+            <a:spLocks noRot="1" noChangeAspect="1" noMove="1" noResize="1" noEditPoints="1" noAdjustHandles="1" noChangeArrowheads="1" noChangeShapeType="1" noTextEdit="1"/>
+          </p:cNvSpPr>
+          <p:nvPr/>
+        </p:nvSpPr>
+        <p:spPr>
+          <a:xfrm>
+            <a:off x="507550" y="2536232"/>
+            <a:ext cx="456663" cy="338554"/>
+          </a:xfrm>
+          <a:prstGeom prst="rect">
+            <a:avLst/>
+          </a:prstGeom>
+          <a:blipFill rotWithShape="1">
+            <a:blip r:embed="rId4"/>
+            <a:stretch>
+              <a:fillRect/>
+            </a:stretch>
+          </a:blipFill>
+        </p:spPr>
+        <p:txBody>
+          <a:bodyPr/>
+          <a:lstStyle/>
+          <a:p>
+            <a:r>
+              <a:rPr lang="fr-FR">
+                <a:noFill/>
+              </a:rPr>
+              <a:t> </a:t>
+            </a:r>
+          </a:p>
+        </p:txBody>
+      </p:sp>
+      <p:sp>
+        <p:nvSpPr>
+          <p:cNvPr id="14" name="Arc 13"/>
+          <p:cNvSpPr/>
+          <p:nvPr/>
+        </p:nvSpPr>
+        <p:spPr>
+          <a:xfrm>
+            <a:off x="24904" y="1801177"/>
+            <a:ext cx="1872208" cy="1840436"/>
+          </a:xfrm>
+          <a:prstGeom prst="arc">
+            <a:avLst>
+              <a:gd name="adj1" fmla="val 19980324"/>
+              <a:gd name="adj2" fmla="val 21300240"/>
+            </a:avLst>
+          </a:prstGeom>
+          <a:ln w="28575">
+            <a:solidFill>
+              <a:srgbClr val="C00000"/>
+            </a:solidFill>
+            <a:headEnd type="stealth" w="med" len="lg"/>
+            <a:tailEnd type="none"/>
+          </a:ln>
+        </p:spPr>
+        <p:style>
+          <a:lnRef idx="1">
+            <a:schemeClr val="accent1"/>
+          </a:lnRef>
+          <a:fillRef idx="0">
+            <a:schemeClr val="accent1"/>
+          </a:fillRef>
+          <a:effectRef idx="0">
+            <a:schemeClr val="accent1"/>
+          </a:effectRef>
+          <a:fontRef idx="minor">
+            <a:schemeClr val="tx1"/>
+          </a:fontRef>
+        </p:style>
+        <p:txBody>
+          <a:bodyPr rtlCol="0" anchor="ctr"/>
+          <a:lstStyle/>
+          <a:p>
+            <a:pPr algn="ctr"/>
+            <a:endParaRPr lang="fr-FR"/>
+          </a:p>
+        </p:txBody>
+      </p:sp>
+      <p:sp>
+        <p:nvSpPr>
+          <p:cNvPr id="15" name="ZoneTexte 14"/>
+          <p:cNvSpPr txBox="1">
+            <a:spLocks noRot="1" noChangeAspect="1" noMove="1" noResize="1" noEditPoints="1" noAdjustHandles="1" noChangeArrowheads="1" noChangeShapeType="1" noTextEdit="1"/>
+          </p:cNvSpPr>
+          <p:nvPr/>
+        </p:nvSpPr>
+        <p:spPr>
+          <a:xfrm>
+            <a:off x="1768747" y="2248200"/>
+            <a:ext cx="724514" cy="338554"/>
+          </a:xfrm>
+          <a:prstGeom prst="rect">
+            <a:avLst/>
+          </a:prstGeom>
+          <a:blipFill rotWithShape="1">
+            <a:blip r:embed="rId5"/>
+            <a:stretch>
+              <a:fillRect b="-10909"/>
+            </a:stretch>
+          </a:blipFill>
+        </p:spPr>
+        <p:txBody>
+          <a:bodyPr/>
+          <a:lstStyle/>
+          <a:p>
+            <a:r>
+              <a:rPr lang="fr-FR">
+                <a:noFill/>
+              </a:rPr>
+              <a:t> </a:t>
+            </a:r>
+          </a:p>
+        </p:txBody>
+      </p:sp>
+      <p:cxnSp>
+        <p:nvCxnSpPr>
+          <p:cNvPr id="17" name="Connecteur droit avec flèche 16"/>
+          <p:cNvCxnSpPr/>
+          <p:nvPr/>
+        </p:nvCxnSpPr>
+        <p:spPr>
+          <a:xfrm>
+            <a:off x="3835237" y="2705510"/>
+            <a:ext cx="1440160" cy="0"/>
+          </a:xfrm>
+          <a:prstGeom prst="straightConnector1">
+            <a:avLst/>
+          </a:prstGeom>
+          <a:ln w="28575">
+            <a:solidFill>
+              <a:srgbClr val="7030A0"/>
+            </a:solidFill>
+            <a:tailEnd type="stealth" w="med" len="lg"/>
+          </a:ln>
+        </p:spPr>
+        <p:style>
+          <a:lnRef idx="1">
+            <a:schemeClr val="accent1"/>
+          </a:lnRef>
+          <a:fillRef idx="0">
+            <a:schemeClr val="accent1"/>
+          </a:fillRef>
+          <a:effectRef idx="0">
+            <a:schemeClr val="accent1"/>
+          </a:effectRef>
+          <a:fontRef idx="minor">
+            <a:schemeClr val="tx1"/>
+          </a:fontRef>
+        </p:style>
+      </p:cxnSp>
+      <p:cxnSp>
+        <p:nvCxnSpPr>
+          <p:cNvPr id="18" name="Connecteur droit avec flèche 17"/>
+          <p:cNvCxnSpPr/>
+          <p:nvPr/>
+        </p:nvCxnSpPr>
+        <p:spPr>
+          <a:xfrm flipV="1">
+            <a:off x="3835237" y="1265351"/>
+            <a:ext cx="0" cy="1440160"/>
+          </a:xfrm>
+          <a:prstGeom prst="straightConnector1">
+            <a:avLst/>
+          </a:prstGeom>
+          <a:ln w="28575">
+            <a:solidFill>
+              <a:srgbClr val="7030A0"/>
+            </a:solidFill>
+            <a:tailEnd type="stealth" w="med" len="lg"/>
+          </a:ln>
+        </p:spPr>
+        <p:style>
+          <a:lnRef idx="1">
+            <a:schemeClr val="accent1"/>
+          </a:lnRef>
+          <a:fillRef idx="0">
+            <a:schemeClr val="accent1"/>
+          </a:fillRef>
+          <a:effectRef idx="0">
+            <a:schemeClr val="accent1"/>
+          </a:effectRef>
+          <a:fontRef idx="minor">
+            <a:schemeClr val="tx1"/>
+          </a:fontRef>
+        </p:style>
+      </p:cxnSp>
+      <p:sp>
+        <p:nvSpPr>
+          <p:cNvPr id="19" name="ZoneTexte 18"/>
+          <p:cNvSpPr txBox="1">
+            <a:spLocks noRot="1" noChangeAspect="1" noMove="1" noResize="1" noEditPoints="1" noAdjustHandles="1" noChangeArrowheads="1" noChangeShapeType="1" noTextEdit="1"/>
+          </p:cNvSpPr>
+          <p:nvPr/>
+        </p:nvSpPr>
+        <p:spPr>
+          <a:xfrm>
+            <a:off x="3661759" y="2705511"/>
+            <a:ext cx="353366" cy="338554"/>
+          </a:xfrm>
+          <a:prstGeom prst="rect">
+            <a:avLst/>
+          </a:prstGeom>
+          <a:blipFill rotWithShape="1">
+            <a:blip r:embed="rId6"/>
+            <a:stretch>
+              <a:fillRect/>
+            </a:stretch>
+          </a:blipFill>
+        </p:spPr>
+        <p:txBody>
+          <a:bodyPr/>
+          <a:lstStyle/>
+          <a:p>
+            <a:r>
+              <a:rPr lang="fr-FR">
+                <a:noFill/>
+              </a:rPr>
+              <a:t> </a:t>
+            </a:r>
+          </a:p>
+        </p:txBody>
+      </p:sp>
+      <p:grpSp>
+        <p:nvGrpSpPr>
+          <p:cNvPr id="20" name="Groupe 19"/>
+          <p:cNvGrpSpPr/>
+          <p:nvPr/>
+        </p:nvGrpSpPr>
+        <p:grpSpPr>
+          <a:xfrm rot="19800000">
+            <a:off x="3378725" y="1001782"/>
+            <a:ext cx="1440160" cy="1440160"/>
+            <a:chOff x="6732240" y="1268762"/>
+            <a:chExt cx="1440160" cy="1440160"/>
+          </a:xfrm>
+        </p:grpSpPr>
+        <p:cxnSp>
+          <p:nvCxnSpPr>
+            <p:cNvPr id="21" name="Connecteur droit avec flèche 20"/>
+            <p:cNvCxnSpPr/>
+            <p:nvPr/>
+          </p:nvCxnSpPr>
+          <p:spPr>
+            <a:xfrm>
+              <a:off x="6732240" y="2708921"/>
+              <a:ext cx="1440160" cy="0"/>
+            </a:xfrm>
+            <a:prstGeom prst="straightConnector1">
+              <a:avLst/>
+            </a:prstGeom>
+            <a:ln w="28575">
+              <a:solidFill>
+                <a:srgbClr val="92D050"/>
+              </a:solidFill>
+              <a:tailEnd type="stealth" w="med" len="lg"/>
+            </a:ln>
+          </p:spPr>
+          <p:style>
+            <a:lnRef idx="1">
+              <a:schemeClr val="accent1"/>
+            </a:lnRef>
+            <a:fillRef idx="0">
+              <a:schemeClr val="accent1"/>
+            </a:fillRef>
+            <a:effectRef idx="0">
+              <a:schemeClr val="accent1"/>
+            </a:effectRef>
+            <a:fontRef idx="minor">
+              <a:schemeClr val="tx1"/>
+            </a:fontRef>
+          </p:style>
+        </p:cxnSp>
+        <p:cxnSp>
+          <p:nvCxnSpPr>
+            <p:cNvPr id="22" name="Connecteur droit avec flèche 21"/>
+            <p:cNvCxnSpPr/>
+            <p:nvPr/>
+          </p:nvCxnSpPr>
+          <p:spPr>
+            <a:xfrm flipV="1">
+              <a:off x="6732240" y="1268762"/>
+              <a:ext cx="0" cy="1440160"/>
+            </a:xfrm>
+            <a:prstGeom prst="straightConnector1">
+              <a:avLst/>
+            </a:prstGeom>
+            <a:ln w="28575">
+              <a:solidFill>
+                <a:srgbClr val="92D050"/>
+              </a:solidFill>
+              <a:tailEnd type="stealth" w="med" len="lg"/>
+            </a:ln>
+          </p:spPr>
+          <p:style>
+            <a:lnRef idx="1">
+              <a:schemeClr val="accent1"/>
+            </a:lnRef>
+            <a:fillRef idx="0">
+              <a:schemeClr val="accent1"/>
+            </a:fillRef>
+            <a:effectRef idx="0">
+              <a:schemeClr val="accent1"/>
+            </a:effectRef>
+            <a:fontRef idx="minor">
+              <a:schemeClr val="tx1"/>
+            </a:fontRef>
+          </p:style>
+        </p:cxnSp>
+      </p:grpSp>
+      <p:sp>
+        <p:nvSpPr>
+          <p:cNvPr id="23" name="ZoneTexte 22"/>
+          <p:cNvSpPr txBox="1">
+            <a:spLocks noRot="1" noChangeAspect="1" noMove="1" noResize="1" noEditPoints="1" noAdjustHandles="1" noChangeArrowheads="1" noChangeShapeType="1" noTextEdit="1"/>
+          </p:cNvSpPr>
+          <p:nvPr/>
+        </p:nvSpPr>
+        <p:spPr>
+          <a:xfrm>
+            <a:off x="5082453" y="1616929"/>
+            <a:ext cx="389466" cy="338554"/>
+          </a:xfrm>
+          <a:prstGeom prst="rect">
+            <a:avLst/>
+          </a:prstGeom>
+          <a:blipFill rotWithShape="1">
+            <a:blip r:embed="rId7"/>
+            <a:stretch>
+              <a:fillRect/>
+            </a:stretch>
+          </a:blipFill>
+        </p:spPr>
+        <p:txBody>
+          <a:bodyPr/>
+          <a:lstStyle/>
+          <a:p>
+            <a:r>
+              <a:rPr lang="fr-FR">
+                <a:noFill/>
+              </a:rPr>
+              <a:t> </a:t>
+            </a:r>
+          </a:p>
+        </p:txBody>
+      </p:sp>
+      <p:sp>
+        <p:nvSpPr>
+          <p:cNvPr id="24" name="ZoneTexte 23"/>
+          <p:cNvSpPr txBox="1">
+            <a:spLocks noRot="1" noChangeAspect="1" noMove="1" noResize="1" noEditPoints="1" noAdjustHandles="1" noChangeArrowheads="1" noChangeShapeType="1" noTextEdit="1"/>
+          </p:cNvSpPr>
+          <p:nvPr/>
+        </p:nvSpPr>
+        <p:spPr>
+          <a:xfrm>
+            <a:off x="5275397" y="2536231"/>
+            <a:ext cx="349390" cy="338554"/>
+          </a:xfrm>
+          <a:prstGeom prst="rect">
+            <a:avLst/>
+          </a:prstGeom>
+          <a:blipFill rotWithShape="1">
+            <a:blip r:embed="rId8"/>
+            <a:stretch>
+              <a:fillRect t="-14286" r="-18966"/>
+            </a:stretch>
+          </a:blipFill>
+        </p:spPr>
+        <p:txBody>
+          <a:bodyPr/>
+          <a:lstStyle/>
+          <a:p>
+            <a:r>
+              <a:rPr lang="fr-FR">
+                <a:noFill/>
+              </a:rPr>
+              <a:t> </a:t>
+            </a:r>
+          </a:p>
+        </p:txBody>
+      </p:sp>
+      <p:sp>
+        <p:nvSpPr>
+          <p:cNvPr id="25" name="ZoneTexte 24"/>
+          <p:cNvSpPr txBox="1">
+            <a:spLocks noRot="1" noChangeAspect="1" noMove="1" noResize="1" noEditPoints="1" noAdjustHandles="1" noChangeArrowheads="1" noChangeShapeType="1" noTextEdit="1"/>
+          </p:cNvSpPr>
+          <p:nvPr/>
+        </p:nvSpPr>
+        <p:spPr>
+          <a:xfrm>
+            <a:off x="3381779" y="2536233"/>
+            <a:ext cx="456663" cy="338554"/>
+          </a:xfrm>
+          <a:prstGeom prst="rect">
+            <a:avLst/>
+          </a:prstGeom>
+          <a:blipFill rotWithShape="1">
+            <a:blip r:embed="rId9"/>
+            <a:stretch>
+              <a:fillRect/>
+            </a:stretch>
+          </a:blipFill>
+        </p:spPr>
+        <p:txBody>
+          <a:bodyPr/>
+          <a:lstStyle/>
+          <a:p>
+            <a:r>
+              <a:rPr lang="fr-FR">
+                <a:noFill/>
+              </a:rPr>
+              <a:t> </a:t>
+            </a:r>
+          </a:p>
+        </p:txBody>
+      </p:sp>
+      <p:sp>
+        <p:nvSpPr>
+          <p:cNvPr id="26" name="Arc 25"/>
+          <p:cNvSpPr/>
+          <p:nvPr/>
+        </p:nvSpPr>
+        <p:spPr>
+          <a:xfrm>
+            <a:off x="2899133" y="1801178"/>
+            <a:ext cx="1872208" cy="1840436"/>
+          </a:xfrm>
+          <a:prstGeom prst="arc">
+            <a:avLst>
+              <a:gd name="adj1" fmla="val 19980324"/>
+              <a:gd name="adj2" fmla="val 21300240"/>
+            </a:avLst>
+          </a:prstGeom>
+          <a:ln w="28575">
+            <a:solidFill>
+              <a:srgbClr val="C00000"/>
+            </a:solidFill>
+            <a:headEnd type="stealth" w="med" len="lg"/>
+            <a:tailEnd type="none"/>
+          </a:ln>
+        </p:spPr>
+        <p:style>
+          <a:lnRef idx="1">
+            <a:schemeClr val="accent1"/>
+          </a:lnRef>
+          <a:fillRef idx="0">
+            <a:schemeClr val="accent1"/>
+          </a:fillRef>
+          <a:effectRef idx="0">
+            <a:schemeClr val="accent1"/>
+          </a:effectRef>
+          <a:fontRef idx="minor">
+            <a:schemeClr val="tx1"/>
+          </a:fontRef>
+        </p:style>
+        <p:txBody>
+          <a:bodyPr rtlCol="0" anchor="ctr"/>
+          <a:lstStyle/>
+          <a:p>
+            <a:pPr algn="ctr"/>
+            <a:endParaRPr lang="fr-FR"/>
+          </a:p>
+        </p:txBody>
+      </p:sp>
+      <p:sp>
+        <p:nvSpPr>
+          <p:cNvPr id="27" name="ZoneTexte 26"/>
+          <p:cNvSpPr txBox="1">
+            <a:spLocks noRot="1" noChangeAspect="1" noMove="1" noResize="1" noEditPoints="1" noAdjustHandles="1" noChangeArrowheads="1" noChangeShapeType="1" noTextEdit="1"/>
+          </p:cNvSpPr>
+          <p:nvPr/>
+        </p:nvSpPr>
+        <p:spPr>
+          <a:xfrm>
+            <a:off x="4642976" y="2248201"/>
+            <a:ext cx="724514" cy="338554"/>
+          </a:xfrm>
+          <a:prstGeom prst="rect">
+            <a:avLst/>
+          </a:prstGeom>
+          <a:blipFill rotWithShape="1">
+            <a:blip r:embed="rId10"/>
+            <a:stretch>
+              <a:fillRect b="-10909"/>
+            </a:stretch>
+          </a:blipFill>
+        </p:spPr>
+        <p:txBody>
+          <a:bodyPr/>
+          <a:lstStyle/>
+          <a:p>
+            <a:r>
+              <a:rPr lang="fr-FR">
+                <a:noFill/>
+              </a:rPr>
+              <a:t> </a:t>
+            </a:r>
+          </a:p>
+        </p:txBody>
+      </p:sp>
+      <p:cxnSp>
+        <p:nvCxnSpPr>
+          <p:cNvPr id="30" name="Connecteur droit avec flèche 29"/>
+          <p:cNvCxnSpPr/>
+          <p:nvPr/>
+        </p:nvCxnSpPr>
+        <p:spPr>
+          <a:xfrm>
+            <a:off x="6721648" y="2704629"/>
+            <a:ext cx="1440160" cy="0"/>
+          </a:xfrm>
+          <a:prstGeom prst="straightConnector1">
+            <a:avLst/>
+          </a:prstGeom>
+          <a:ln w="28575">
+            <a:solidFill>
+              <a:srgbClr val="92D050"/>
+            </a:solidFill>
+            <a:tailEnd type="stealth" w="med" len="lg"/>
+          </a:ln>
+        </p:spPr>
+        <p:style>
+          <a:lnRef idx="1">
+            <a:schemeClr val="accent1"/>
+          </a:lnRef>
+          <a:fillRef idx="0">
+            <a:schemeClr val="accent1"/>
+          </a:fillRef>
+          <a:effectRef idx="0">
+            <a:schemeClr val="accent1"/>
+          </a:effectRef>
+          <a:fontRef idx="minor">
+            <a:schemeClr val="tx1"/>
+          </a:fontRef>
+        </p:style>
+      </p:cxnSp>
+      <p:cxnSp>
+        <p:nvCxnSpPr>
+          <p:cNvPr id="31" name="Connecteur droit avec flèche 30"/>
+          <p:cNvCxnSpPr/>
+          <p:nvPr/>
+        </p:nvCxnSpPr>
+        <p:spPr>
+          <a:xfrm flipV="1">
+            <a:off x="6721648" y="1264470"/>
+            <a:ext cx="0" cy="1440160"/>
+          </a:xfrm>
+          <a:prstGeom prst="straightConnector1">
+            <a:avLst/>
+          </a:prstGeom>
+          <a:ln w="28575">
+            <a:solidFill>
+              <a:srgbClr val="92D050"/>
+            </a:solidFill>
+            <a:tailEnd type="stealth" w="med" len="lg"/>
+          </a:ln>
+        </p:spPr>
+        <p:style>
+          <a:lnRef idx="1">
+            <a:schemeClr val="accent1"/>
+          </a:lnRef>
+          <a:fillRef idx="0">
+            <a:schemeClr val="accent1"/>
+          </a:fillRef>
+          <a:effectRef idx="0">
+            <a:schemeClr val="accent1"/>
+          </a:effectRef>
+          <a:fontRef idx="minor">
+            <a:schemeClr val="tx1"/>
+          </a:fontRef>
+        </p:style>
+      </p:cxnSp>
+      <p:grpSp>
+        <p:nvGrpSpPr>
+          <p:cNvPr id="33" name="Groupe 32"/>
+          <p:cNvGrpSpPr/>
+          <p:nvPr/>
+        </p:nvGrpSpPr>
+        <p:grpSpPr>
+          <a:xfrm rot="19800000">
+            <a:off x="6265136" y="1000901"/>
+            <a:ext cx="1440160" cy="1440160"/>
+            <a:chOff x="6732240" y="1268762"/>
+            <a:chExt cx="1440160" cy="1440160"/>
+          </a:xfrm>
+        </p:grpSpPr>
+        <p:cxnSp>
+          <p:nvCxnSpPr>
+            <p:cNvPr id="34" name="Connecteur droit avec flèche 33"/>
+            <p:cNvCxnSpPr/>
+            <p:nvPr/>
+          </p:nvCxnSpPr>
+          <p:spPr>
+            <a:xfrm>
+              <a:off x="6732240" y="2708921"/>
+              <a:ext cx="1440160" cy="0"/>
+            </a:xfrm>
+            <a:prstGeom prst="straightConnector1">
+              <a:avLst/>
+            </a:prstGeom>
+            <a:ln w="28575">
+              <a:solidFill>
+                <a:schemeClr val="accent6">
+                  <a:lumMod val="75000"/>
+                </a:schemeClr>
+              </a:solidFill>
+              <a:tailEnd type="stealth" w="med" len="lg"/>
+            </a:ln>
+          </p:spPr>
+          <p:style>
+            <a:lnRef idx="1">
+              <a:schemeClr val="accent1"/>
+            </a:lnRef>
+            <a:fillRef idx="0">
+              <a:schemeClr val="accent1"/>
+            </a:fillRef>
+            <a:effectRef idx="0">
+              <a:schemeClr val="accent1"/>
+            </a:effectRef>
+            <a:fontRef idx="minor">
+              <a:schemeClr val="tx1"/>
+            </a:fontRef>
+          </p:style>
+        </p:cxnSp>
+        <p:cxnSp>
+          <p:nvCxnSpPr>
+            <p:cNvPr id="35" name="Connecteur droit avec flèche 34"/>
+            <p:cNvCxnSpPr/>
+            <p:nvPr/>
+          </p:nvCxnSpPr>
+          <p:spPr>
+            <a:xfrm flipV="1">
+              <a:off x="6732240" y="1268762"/>
+              <a:ext cx="0" cy="1440160"/>
+            </a:xfrm>
+            <a:prstGeom prst="straightConnector1">
+              <a:avLst/>
+            </a:prstGeom>
+            <a:ln w="28575">
+              <a:solidFill>
+                <a:schemeClr val="accent6">
+                  <a:lumMod val="75000"/>
+                </a:schemeClr>
+              </a:solidFill>
+              <a:tailEnd type="stealth" w="med" len="lg"/>
+            </a:ln>
+          </p:spPr>
+          <p:style>
+            <a:lnRef idx="1">
+              <a:schemeClr val="accent1"/>
+            </a:lnRef>
+            <a:fillRef idx="0">
+              <a:schemeClr val="accent1"/>
+            </a:fillRef>
+            <a:effectRef idx="0">
+              <a:schemeClr val="accent1"/>
+            </a:effectRef>
+            <a:fontRef idx="minor">
+              <a:schemeClr val="tx1"/>
+            </a:fontRef>
+          </p:style>
+        </p:cxnSp>
+      </p:grpSp>
+      <p:sp>
+        <p:nvSpPr>
+          <p:cNvPr id="37" name="ZoneTexte 36"/>
+          <p:cNvSpPr txBox="1">
+            <a:spLocks noRot="1" noChangeAspect="1" noMove="1" noResize="1" noEditPoints="1" noAdjustHandles="1" noChangeArrowheads="1" noChangeShapeType="1" noTextEdit="1"/>
+          </p:cNvSpPr>
+          <p:nvPr/>
+        </p:nvSpPr>
+        <p:spPr>
+          <a:xfrm>
+            <a:off x="8161808" y="2535350"/>
+            <a:ext cx="353365" cy="338554"/>
+          </a:xfrm>
+          <a:prstGeom prst="rect">
+            <a:avLst/>
+          </a:prstGeom>
+          <a:blipFill rotWithShape="1">
+            <a:blip r:embed="rId11"/>
+            <a:stretch>
+              <a:fillRect/>
+            </a:stretch>
+          </a:blipFill>
+        </p:spPr>
+        <p:txBody>
+          <a:bodyPr/>
+          <a:lstStyle/>
+          <a:p>
+            <a:r>
+              <a:rPr lang="fr-FR">
+                <a:noFill/>
+              </a:rPr>
+              <a:t> </a:t>
+            </a:r>
+          </a:p>
+        </p:txBody>
+      </p:sp>
+      <p:sp>
+        <p:nvSpPr>
+          <p:cNvPr id="38" name="ZoneTexte 37"/>
+          <p:cNvSpPr txBox="1">
+            <a:spLocks noRot="1" noChangeAspect="1" noMove="1" noResize="1" noEditPoints="1" noAdjustHandles="1" noChangeArrowheads="1" noChangeShapeType="1" noTextEdit="1"/>
+          </p:cNvSpPr>
+          <p:nvPr/>
+        </p:nvSpPr>
+        <p:spPr>
+          <a:xfrm>
+            <a:off x="6268190" y="2535352"/>
+            <a:ext cx="456663" cy="338554"/>
+          </a:xfrm>
+          <a:prstGeom prst="rect">
+            <a:avLst/>
+          </a:prstGeom>
+          <a:blipFill rotWithShape="1">
+            <a:blip r:embed="rId12"/>
+            <a:stretch>
+              <a:fillRect/>
+            </a:stretch>
+          </a:blipFill>
+        </p:spPr>
+        <p:txBody>
+          <a:bodyPr/>
+          <a:lstStyle/>
+          <a:p>
+            <a:r>
+              <a:rPr lang="fr-FR">
+                <a:noFill/>
+              </a:rPr>
+              <a:t> </a:t>
+            </a:r>
+          </a:p>
+        </p:txBody>
+      </p:sp>
+      <p:sp>
+        <p:nvSpPr>
+          <p:cNvPr id="39" name="Arc 38"/>
+          <p:cNvSpPr/>
+          <p:nvPr/>
+        </p:nvSpPr>
+        <p:spPr>
+          <a:xfrm>
+            <a:off x="5785544" y="1800297"/>
+            <a:ext cx="1872208" cy="1840436"/>
+          </a:xfrm>
+          <a:prstGeom prst="arc">
+            <a:avLst>
+              <a:gd name="adj1" fmla="val 19980324"/>
+              <a:gd name="adj2" fmla="val 21300240"/>
+            </a:avLst>
+          </a:prstGeom>
+          <a:ln w="28575">
+            <a:solidFill>
+              <a:srgbClr val="C00000"/>
+            </a:solidFill>
+            <a:headEnd type="stealth" w="med" len="lg"/>
+            <a:tailEnd type="none"/>
+          </a:ln>
+        </p:spPr>
+        <p:style>
+          <a:lnRef idx="1">
+            <a:schemeClr val="accent1"/>
+          </a:lnRef>
+          <a:fillRef idx="0">
+            <a:schemeClr val="accent1"/>
+          </a:fillRef>
+          <a:effectRef idx="0">
+            <a:schemeClr val="accent1"/>
+          </a:effectRef>
+          <a:fontRef idx="minor">
+            <a:schemeClr val="tx1"/>
+          </a:fontRef>
+        </p:style>
+        <p:txBody>
+          <a:bodyPr rtlCol="0" anchor="ctr"/>
+          <a:lstStyle/>
+          <a:p>
+            <a:pPr algn="ctr"/>
+            <a:endParaRPr lang="fr-FR"/>
+          </a:p>
+        </p:txBody>
+      </p:sp>
+      <p:sp>
+        <p:nvSpPr>
+          <p:cNvPr id="40" name="ZoneTexte 39"/>
+          <p:cNvSpPr txBox="1">
+            <a:spLocks noRot="1" noChangeAspect="1" noMove="1" noResize="1" noEditPoints="1" noAdjustHandles="1" noChangeArrowheads="1" noChangeShapeType="1" noTextEdit="1"/>
+          </p:cNvSpPr>
+          <p:nvPr/>
+        </p:nvSpPr>
+        <p:spPr>
+          <a:xfrm>
+            <a:off x="7529387" y="2247320"/>
+            <a:ext cx="724514" cy="338554"/>
+          </a:xfrm>
+          <a:prstGeom prst="rect">
+            <a:avLst/>
+          </a:prstGeom>
+          <a:blipFill rotWithShape="1">
+            <a:blip r:embed="rId13"/>
+            <a:stretch>
+              <a:fillRect b="-10909"/>
+            </a:stretch>
+          </a:blipFill>
+        </p:spPr>
+        <p:txBody>
+          <a:bodyPr/>
+          <a:lstStyle/>
+          <a:p>
+            <a:r>
+              <a:rPr lang="fr-FR">
+                <a:noFill/>
+              </a:rPr>
+              <a:t> </a:t>
+            </a:r>
+          </a:p>
+        </p:txBody>
+      </p:sp>
+      <p:sp>
+        <p:nvSpPr>
+          <p:cNvPr id="41" name="ZoneTexte 40"/>
+          <p:cNvSpPr txBox="1">
+            <a:spLocks noRot="1" noChangeAspect="1" noMove="1" noResize="1" noEditPoints="1" noAdjustHandles="1" noChangeArrowheads="1" noChangeShapeType="1" noTextEdit="1"/>
+          </p:cNvSpPr>
+          <p:nvPr/>
+        </p:nvSpPr>
+        <p:spPr>
+          <a:xfrm>
+            <a:off x="6655731" y="995767"/>
+            <a:ext cx="389466" cy="338554"/>
+          </a:xfrm>
+          <a:prstGeom prst="rect">
+            <a:avLst/>
+          </a:prstGeom>
+          <a:blipFill rotWithShape="1">
+            <a:blip r:embed="rId14"/>
+            <a:stretch>
+              <a:fillRect/>
+            </a:stretch>
+          </a:blipFill>
+        </p:spPr>
+        <p:txBody>
+          <a:bodyPr/>
+          <a:lstStyle/>
+          <a:p>
+            <a:r>
+              <a:rPr lang="fr-FR">
+                <a:noFill/>
+              </a:rPr>
+              <a:t> </a:t>
+            </a:r>
+          </a:p>
+        </p:txBody>
+      </p:sp>
+      <mc:AlternateContent xmlns:mc="http://schemas.openxmlformats.org/markup-compatibility/2006">
+        <mc:Choice xmlns:a14="http://schemas.microsoft.com/office/drawing/2010/main" Requires="a14">
+          <p:sp>
+            <p:nvSpPr>
+              <p:cNvPr id="43" name="ZoneTexte 42"/>
+              <p:cNvSpPr txBox="1"/>
+              <p:nvPr/>
+            </p:nvSpPr>
+            <p:spPr>
+              <a:xfrm>
+                <a:off x="781280" y="2704627"/>
+                <a:ext cx="406906" cy="339645"/>
+              </a:xfrm>
+              <a:prstGeom prst="rect">
+                <a:avLst/>
+              </a:prstGeom>
+              <a:noFill/>
+            </p:spPr>
+            <p:txBody>
+              <a:bodyPr wrap="none" rtlCol="0">
+                <a:spAutoFit/>
+              </a:bodyPr>
+              <a:lstStyle/>
+              <a:p>
+                <a14:m>
+                  <m:oMathPara xmlns:m="http://schemas.openxmlformats.org/officeDocument/2006/math">
+                    <m:oMathParaPr>
+                      <m:jc m:val="centerGroup"/>
+                    </m:oMathParaPr>
+                    <m:oMath xmlns:m="http://schemas.openxmlformats.org/officeDocument/2006/math">
+                      <m:acc>
+                        <m:accPr>
+                          <m:chr m:val="⃗"/>
+                          <m:ctrlPr>
+                            <a:rPr lang="fr-FR" sz="1400" i="1" smtClean="0">
+                              <a:latin typeface="Cambria Math"/>
+                            </a:rPr>
+                          </m:ctrlPr>
+                        </m:accPr>
+                        <m:e>
+                          <m:sSub>
+                            <m:sSubPr>
+                              <m:ctrlPr>
+                                <a:rPr lang="fr-FR" sz="1400" b="0" i="1" smtClean="0">
+                                  <a:latin typeface="Cambria Math"/>
+                                </a:rPr>
+                              </m:ctrlPr>
+                            </m:sSubPr>
+                            <m:e>
+                              <m:r>
+                                <a:rPr lang="fr-FR" sz="1400" b="0" i="1" smtClean="0">
+                                  <a:latin typeface="Cambria Math"/>
+                                </a:rPr>
+                                <m:t>𝑘</m:t>
+                              </m:r>
+                            </m:e>
+                            <m:sub>
+                              <m:r>
+                                <a:rPr lang="fr-FR" sz="1400" b="0" i="1" smtClean="0">
+                                  <a:latin typeface="Cambria Math"/>
+                                </a:rPr>
+                                <m:t>0</m:t>
+                              </m:r>
+                            </m:sub>
+                          </m:sSub>
+                        </m:e>
+                      </m:acc>
+                    </m:oMath>
+                  </m:oMathPara>
+                </a14:m>
+                <a:endParaRPr lang="fr-FR" sz="1400" dirty="0"/>
+              </a:p>
+            </p:txBody>
+          </p:sp>
+        </mc:Choice>
+        <mc:Fallback>
+          <p:sp>
+            <p:nvSpPr>
+              <p:cNvPr id="43" name="ZoneTexte 42"/>
+              <p:cNvSpPr txBox="1">
+                <a:spLocks noRot="1" noChangeAspect="1" noMove="1" noResize="1" noEditPoints="1" noAdjustHandles="1" noChangeArrowheads="1" noChangeShapeType="1" noTextEdit="1"/>
+              </p:cNvSpPr>
+              <p:nvPr/>
+            </p:nvSpPr>
+            <p:spPr>
+              <a:xfrm>
+                <a:off x="781280" y="2704627"/>
+                <a:ext cx="406906" cy="339645"/>
+              </a:xfrm>
+              <a:prstGeom prst="rect">
+                <a:avLst/>
+              </a:prstGeom>
+              <a:blipFill rotWithShape="1">
+                <a:blip r:embed="rId15"/>
+                <a:stretch>
+                  <a:fillRect/>
+                </a:stretch>
+              </a:blipFill>
+            </p:spPr>
+            <p:txBody>
+              <a:bodyPr/>
+              <a:lstStyle/>
+              <a:p>
+                <a:r>
+                  <a:rPr lang="fr-FR">
+                    <a:noFill/>
+                  </a:rPr>
+                  <a:t> </a:t>
+                </a:r>
+              </a:p>
+            </p:txBody>
+          </p:sp>
+        </mc:Fallback>
+      </mc:AlternateContent>
+      <mc:AlternateContent xmlns:mc="http://schemas.openxmlformats.org/markup-compatibility/2006">
+        <mc:Choice xmlns:a14="http://schemas.microsoft.com/office/drawing/2010/main" Requires="a14">
+          <p:sp>
+            <p:nvSpPr>
+              <p:cNvPr id="45" name="ZoneTexte 44"/>
+              <p:cNvSpPr txBox="1"/>
+              <p:nvPr/>
+            </p:nvSpPr>
+            <p:spPr>
+              <a:xfrm>
+                <a:off x="2312602" y="2538395"/>
+                <a:ext cx="363626" cy="332463"/>
+              </a:xfrm>
+              <a:prstGeom prst="rect">
+                <a:avLst/>
+              </a:prstGeom>
+              <a:noFill/>
+            </p:spPr>
+            <p:txBody>
+              <a:bodyPr wrap="none" rtlCol="0">
+                <a:spAutoFit/>
+              </a:bodyPr>
+              <a:lstStyle/>
+              <a:p>
+                <a14:m>
+                  <m:oMathPara xmlns:m="http://schemas.openxmlformats.org/officeDocument/2006/math">
+                    <m:oMathParaPr>
+                      <m:jc m:val="centerGroup"/>
+                    </m:oMathParaPr>
+                    <m:oMath xmlns:m="http://schemas.openxmlformats.org/officeDocument/2006/math">
+                      <m:acc>
+                        <m:accPr>
+                          <m:chr m:val="⃗"/>
+                          <m:ctrlPr>
+                            <a:rPr lang="fr-FR" sz="1400" i="1" smtClean="0">
+                              <a:latin typeface="Cambria Math"/>
+                            </a:rPr>
+                          </m:ctrlPr>
+                        </m:accPr>
+                        <m:e>
+                          <m:sSub>
+                            <m:sSubPr>
+                              <m:ctrlPr>
+                                <a:rPr lang="fr-FR" sz="1400" b="0" i="1" smtClean="0">
+                                  <a:latin typeface="Cambria Math"/>
+                                </a:rPr>
+                              </m:ctrlPr>
+                            </m:sSubPr>
+                            <m:e>
+                              <m:r>
+                                <a:rPr lang="fr-FR" sz="1400" b="0" i="1" smtClean="0">
+                                  <a:latin typeface="Cambria Math"/>
+                                </a:rPr>
+                                <m:t>𝑖</m:t>
+                              </m:r>
+                            </m:e>
+                            <m:sub>
+                              <m:r>
+                                <a:rPr lang="fr-FR" sz="1400" b="0" i="1" smtClean="0">
+                                  <a:latin typeface="Cambria Math"/>
+                                </a:rPr>
+                                <m:t>0</m:t>
+                              </m:r>
+                            </m:sub>
+                          </m:sSub>
+                        </m:e>
+                      </m:acc>
+                    </m:oMath>
+                  </m:oMathPara>
+                </a14:m>
+                <a:endParaRPr lang="fr-FR" sz="1400" dirty="0"/>
+              </a:p>
+            </p:txBody>
+          </p:sp>
+        </mc:Choice>
+        <mc:Fallback>
+          <p:sp>
+            <p:nvSpPr>
+              <p:cNvPr id="45" name="ZoneTexte 44"/>
+              <p:cNvSpPr txBox="1">
+                <a:spLocks noRot="1" noChangeAspect="1" noMove="1" noResize="1" noEditPoints="1" noAdjustHandles="1" noChangeArrowheads="1" noChangeShapeType="1" noTextEdit="1"/>
+              </p:cNvSpPr>
+              <p:nvPr/>
+            </p:nvSpPr>
+            <p:spPr>
+              <a:xfrm>
+                <a:off x="2312602" y="2538395"/>
+                <a:ext cx="363626" cy="332463"/>
+              </a:xfrm>
+              <a:prstGeom prst="rect">
+                <a:avLst/>
+              </a:prstGeom>
+              <a:blipFill rotWithShape="1">
+                <a:blip r:embed="rId16"/>
+                <a:stretch>
+                  <a:fillRect/>
+                </a:stretch>
+              </a:blipFill>
+            </p:spPr>
+            <p:txBody>
+              <a:bodyPr/>
+              <a:lstStyle/>
+              <a:p>
+                <a:r>
+                  <a:rPr lang="fr-FR">
+                    <a:noFill/>
+                  </a:rPr>
+                  <a:t> </a:t>
+                </a:r>
+              </a:p>
+            </p:txBody>
+          </p:sp>
+        </mc:Fallback>
+      </mc:AlternateContent>
+      <mc:AlternateContent xmlns:mc="http://schemas.openxmlformats.org/markup-compatibility/2006">
+        <mc:Choice xmlns:a14="http://schemas.microsoft.com/office/drawing/2010/main" Requires="a14">
+          <p:sp>
+            <p:nvSpPr>
+              <p:cNvPr id="46" name="ZoneTexte 45"/>
+              <p:cNvSpPr txBox="1"/>
+              <p:nvPr/>
+            </p:nvSpPr>
+            <p:spPr>
+              <a:xfrm>
+                <a:off x="780350" y="935231"/>
+                <a:ext cx="365485" cy="332463"/>
+              </a:xfrm>
+              <a:prstGeom prst="rect">
+                <a:avLst/>
+              </a:prstGeom>
+              <a:noFill/>
+            </p:spPr>
+            <p:txBody>
+              <a:bodyPr wrap="none" rtlCol="0">
+                <a:spAutoFit/>
+              </a:bodyPr>
+              <a:lstStyle/>
+              <a:p>
+                <a14:m>
+                  <m:oMathPara xmlns:m="http://schemas.openxmlformats.org/officeDocument/2006/math">
+                    <m:oMathParaPr>
+                      <m:jc m:val="centerGroup"/>
+                    </m:oMathParaPr>
+                    <m:oMath xmlns:m="http://schemas.openxmlformats.org/officeDocument/2006/math">
+                      <m:acc>
+                        <m:accPr>
+                          <m:chr m:val="⃗"/>
+                          <m:ctrlPr>
+                            <a:rPr lang="fr-FR" sz="1400" i="1" smtClean="0">
+                              <a:latin typeface="Cambria Math"/>
+                            </a:rPr>
+                          </m:ctrlPr>
+                        </m:accPr>
+                        <m:e>
+                          <m:sSub>
+                            <m:sSubPr>
+                              <m:ctrlPr>
+                                <a:rPr lang="fr-FR" sz="1400" b="0" i="1" smtClean="0">
+                                  <a:latin typeface="Cambria Math"/>
+                                </a:rPr>
+                              </m:ctrlPr>
+                            </m:sSubPr>
+                            <m:e>
+                              <m:r>
+                                <a:rPr lang="fr-FR" sz="1400" b="0" i="1" smtClean="0">
+                                  <a:latin typeface="Cambria Math"/>
+                                </a:rPr>
+                                <m:t>𝑗</m:t>
+                              </m:r>
+                            </m:e>
+                            <m:sub>
+                              <m:r>
+                                <a:rPr lang="fr-FR" sz="1400" b="0" i="1" smtClean="0">
+                                  <a:latin typeface="Cambria Math"/>
+                                </a:rPr>
+                                <m:t>0</m:t>
+                              </m:r>
+                            </m:sub>
+                          </m:sSub>
+                        </m:e>
+                      </m:acc>
+                    </m:oMath>
+                  </m:oMathPara>
+                </a14:m>
+                <a:endParaRPr lang="fr-FR" sz="1400" dirty="0"/>
+              </a:p>
+            </p:txBody>
+          </p:sp>
+        </mc:Choice>
+        <mc:Fallback>
+          <p:sp>
+            <p:nvSpPr>
+              <p:cNvPr id="46" name="ZoneTexte 45"/>
+              <p:cNvSpPr txBox="1">
+                <a:spLocks noRot="1" noChangeAspect="1" noMove="1" noResize="1" noEditPoints="1" noAdjustHandles="1" noChangeArrowheads="1" noChangeShapeType="1" noTextEdit="1"/>
+              </p:cNvSpPr>
+              <p:nvPr/>
+            </p:nvSpPr>
+            <p:spPr>
+              <a:xfrm>
+                <a:off x="780350" y="935231"/>
+                <a:ext cx="365485" cy="332463"/>
+              </a:xfrm>
+              <a:prstGeom prst="rect">
+                <a:avLst/>
+              </a:prstGeom>
+              <a:blipFill rotWithShape="1">
+                <a:blip r:embed="rId17"/>
+                <a:stretch>
+                  <a:fillRect b="-7273"/>
+                </a:stretch>
+              </a:blipFill>
+            </p:spPr>
+            <p:txBody>
+              <a:bodyPr/>
+              <a:lstStyle/>
+              <a:p>
+                <a:r>
+                  <a:rPr lang="fr-FR">
+                    <a:noFill/>
+                  </a:rPr>
+                  <a:t> </a:t>
+                </a:r>
+              </a:p>
+            </p:txBody>
+          </p:sp>
+        </mc:Fallback>
+      </mc:AlternateContent>
+      <mc:AlternateContent xmlns:mc="http://schemas.openxmlformats.org/markup-compatibility/2006">
+        <mc:Choice xmlns:a14="http://schemas.microsoft.com/office/drawing/2010/main" Requires="a14">
+          <p:sp>
+            <p:nvSpPr>
+              <p:cNvPr id="47" name="ZoneTexte 46"/>
+              <p:cNvSpPr txBox="1"/>
+              <p:nvPr/>
+            </p:nvSpPr>
+            <p:spPr>
+              <a:xfrm>
+                <a:off x="7894565" y="1827743"/>
+                <a:ext cx="359457" cy="332463"/>
+              </a:xfrm>
+              <a:prstGeom prst="rect">
+                <a:avLst/>
+              </a:prstGeom>
+              <a:noFill/>
+            </p:spPr>
+            <p:txBody>
+              <a:bodyPr wrap="none" rtlCol="0">
+                <a:spAutoFit/>
+              </a:bodyPr>
+              <a:lstStyle/>
+              <a:p>
+                <a14:m>
+                  <m:oMathPara xmlns:m="http://schemas.openxmlformats.org/officeDocument/2006/math">
+                    <m:oMathParaPr>
+                      <m:jc m:val="centerGroup"/>
+                    </m:oMathParaPr>
+                    <m:oMath xmlns:m="http://schemas.openxmlformats.org/officeDocument/2006/math">
+                      <m:acc>
+                        <m:accPr>
+                          <m:chr m:val="⃗"/>
+                          <m:ctrlPr>
+                            <a:rPr lang="fr-FR" sz="1400" i="1" smtClean="0">
+                              <a:latin typeface="Cambria Math"/>
+                            </a:rPr>
+                          </m:ctrlPr>
+                        </m:accPr>
+                        <m:e>
+                          <m:sSub>
+                            <m:sSubPr>
+                              <m:ctrlPr>
+                                <a:rPr lang="fr-FR" sz="1400" b="0" i="1" smtClean="0">
+                                  <a:latin typeface="Cambria Math"/>
+                                </a:rPr>
+                              </m:ctrlPr>
+                            </m:sSubPr>
+                            <m:e>
+                              <m:r>
+                                <a:rPr lang="fr-FR" sz="1400" b="0" i="1" smtClean="0">
+                                  <a:latin typeface="Cambria Math"/>
+                                </a:rPr>
+                                <m:t>𝑖</m:t>
+                              </m:r>
+                            </m:e>
+                            <m:sub>
+                              <m:r>
+                                <a:rPr lang="fr-FR" sz="1400" b="0" i="1" smtClean="0">
+                                  <a:latin typeface="Cambria Math"/>
+                                </a:rPr>
+                                <m:t>1</m:t>
+                              </m:r>
+                            </m:sub>
+                          </m:sSub>
+                        </m:e>
+                      </m:acc>
+                    </m:oMath>
+                  </m:oMathPara>
+                </a14:m>
+                <a:endParaRPr lang="fr-FR" sz="1400" dirty="0"/>
+              </a:p>
+            </p:txBody>
+          </p:sp>
+        </mc:Choice>
+        <mc:Fallback>
+          <p:sp>
+            <p:nvSpPr>
+              <p:cNvPr id="47" name="ZoneTexte 46"/>
+              <p:cNvSpPr txBox="1">
+                <a:spLocks noRot="1" noChangeAspect="1" noMove="1" noResize="1" noEditPoints="1" noAdjustHandles="1" noChangeArrowheads="1" noChangeShapeType="1" noTextEdit="1"/>
+              </p:cNvSpPr>
+              <p:nvPr/>
+            </p:nvSpPr>
+            <p:spPr>
+              <a:xfrm>
+                <a:off x="7894565" y="1827743"/>
+                <a:ext cx="359457" cy="332463"/>
+              </a:xfrm>
+              <a:prstGeom prst="rect">
+                <a:avLst/>
+              </a:prstGeom>
+              <a:blipFill rotWithShape="1">
+                <a:blip r:embed="rId18"/>
+                <a:stretch>
+                  <a:fillRect/>
+                </a:stretch>
+              </a:blipFill>
+            </p:spPr>
+            <p:txBody>
+              <a:bodyPr/>
+              <a:lstStyle/>
+              <a:p>
+                <a:r>
+                  <a:rPr lang="fr-FR">
+                    <a:noFill/>
+                  </a:rPr>
+                  <a:t> </a:t>
+                </a:r>
+              </a:p>
+            </p:txBody>
+          </p:sp>
+        </mc:Fallback>
+      </mc:AlternateContent>
+      <mc:AlternateContent xmlns:mc="http://schemas.openxmlformats.org/markup-compatibility/2006">
+        <mc:Choice xmlns:a14="http://schemas.microsoft.com/office/drawing/2010/main" Requires="a14">
+          <p:sp>
+            <p:nvSpPr>
+              <p:cNvPr id="48" name="ZoneTexte 47"/>
+              <p:cNvSpPr txBox="1"/>
+              <p:nvPr/>
+            </p:nvSpPr>
+            <p:spPr>
+              <a:xfrm>
+                <a:off x="5938875" y="1170464"/>
+                <a:ext cx="361317" cy="332463"/>
+              </a:xfrm>
+              <a:prstGeom prst="rect">
+                <a:avLst/>
+              </a:prstGeom>
+              <a:noFill/>
+            </p:spPr>
+            <p:txBody>
+              <a:bodyPr wrap="none" rtlCol="0">
+                <a:spAutoFit/>
+              </a:bodyPr>
+              <a:lstStyle/>
+              <a:p>
+                <a14:m>
+                  <m:oMathPara xmlns:m="http://schemas.openxmlformats.org/officeDocument/2006/math">
+                    <m:oMathParaPr>
+                      <m:jc m:val="centerGroup"/>
+                    </m:oMathParaPr>
+                    <m:oMath xmlns:m="http://schemas.openxmlformats.org/officeDocument/2006/math">
+                      <m:acc>
+                        <m:accPr>
+                          <m:chr m:val="⃗"/>
+                          <m:ctrlPr>
+                            <a:rPr lang="fr-FR" sz="1400" i="1" smtClean="0">
+                              <a:latin typeface="Cambria Math"/>
+                            </a:rPr>
+                          </m:ctrlPr>
+                        </m:accPr>
+                        <m:e>
+                          <m:sSub>
+                            <m:sSubPr>
+                              <m:ctrlPr>
+                                <a:rPr lang="fr-FR" sz="1400" b="0" i="1" smtClean="0">
+                                  <a:latin typeface="Cambria Math"/>
+                                </a:rPr>
+                              </m:ctrlPr>
+                            </m:sSubPr>
+                            <m:e>
+                              <m:r>
+                                <a:rPr lang="fr-FR" sz="1400" b="0" i="1" smtClean="0">
+                                  <a:latin typeface="Cambria Math"/>
+                                </a:rPr>
+                                <m:t>𝑗</m:t>
+                              </m:r>
+                            </m:e>
+                            <m:sub>
+                              <m:r>
+                                <a:rPr lang="fr-FR" sz="1400" b="0" i="1" smtClean="0">
+                                  <a:latin typeface="Cambria Math"/>
+                                </a:rPr>
+                                <m:t>1</m:t>
+                              </m:r>
+                            </m:sub>
+                          </m:sSub>
+                        </m:e>
+                      </m:acc>
+                    </m:oMath>
+                  </m:oMathPara>
+                </a14:m>
+                <a:endParaRPr lang="fr-FR" sz="1400" dirty="0"/>
+              </a:p>
+            </p:txBody>
+          </p:sp>
+        </mc:Choice>
+        <mc:Fallback>
+          <p:sp>
+            <p:nvSpPr>
+              <p:cNvPr id="48" name="ZoneTexte 47"/>
+              <p:cNvSpPr txBox="1">
+                <a:spLocks noRot="1" noChangeAspect="1" noMove="1" noResize="1" noEditPoints="1" noAdjustHandles="1" noChangeArrowheads="1" noChangeShapeType="1" noTextEdit="1"/>
+              </p:cNvSpPr>
+              <p:nvPr/>
+            </p:nvSpPr>
+            <p:spPr>
+              <a:xfrm>
+                <a:off x="5938875" y="1170464"/>
+                <a:ext cx="361317" cy="332463"/>
+              </a:xfrm>
+              <a:prstGeom prst="rect">
+                <a:avLst/>
+              </a:prstGeom>
+              <a:blipFill rotWithShape="1">
+                <a:blip r:embed="rId19"/>
+                <a:stretch>
+                  <a:fillRect b="-7273"/>
+                </a:stretch>
+              </a:blipFill>
+            </p:spPr>
+            <p:txBody>
+              <a:bodyPr/>
+              <a:lstStyle/>
+              <a:p>
+                <a:r>
+                  <a:rPr lang="fr-FR">
+                    <a:noFill/>
+                  </a:rPr>
+                  <a:t> </a:t>
+                </a:r>
+              </a:p>
+            </p:txBody>
+          </p:sp>
+        </mc:Fallback>
+      </mc:AlternateContent>
+      <mc:AlternateContent xmlns:mc="http://schemas.openxmlformats.org/markup-compatibility/2006">
+        <mc:Choice xmlns:a14="http://schemas.microsoft.com/office/drawing/2010/main" Requires="a14">
+          <p:sp>
+            <p:nvSpPr>
+              <p:cNvPr id="49" name="ZoneTexte 48"/>
+              <p:cNvSpPr txBox="1"/>
+              <p:nvPr/>
+            </p:nvSpPr>
+            <p:spPr>
+              <a:xfrm>
+                <a:off x="2979041" y="1183434"/>
+                <a:ext cx="402738" cy="339645"/>
+              </a:xfrm>
+              <a:prstGeom prst="rect">
+                <a:avLst/>
+              </a:prstGeom>
+              <a:noFill/>
+            </p:spPr>
+            <p:txBody>
+              <a:bodyPr wrap="none" rtlCol="0">
+                <a:spAutoFit/>
+              </a:bodyPr>
+              <a:lstStyle/>
+              <a:p>
+                <a14:m>
+                  <m:oMathPara xmlns:m="http://schemas.openxmlformats.org/officeDocument/2006/math">
+                    <m:oMathParaPr>
+                      <m:jc m:val="centerGroup"/>
+                    </m:oMathParaPr>
+                    <m:oMath xmlns:m="http://schemas.openxmlformats.org/officeDocument/2006/math">
+                      <m:acc>
+                        <m:accPr>
+                          <m:chr m:val="⃗"/>
+                          <m:ctrlPr>
+                            <a:rPr lang="fr-FR" sz="1400" i="1" smtClean="0">
+                              <a:latin typeface="Cambria Math"/>
+                            </a:rPr>
+                          </m:ctrlPr>
+                        </m:accPr>
+                        <m:e>
+                          <m:sSub>
+                            <m:sSubPr>
+                              <m:ctrlPr>
+                                <a:rPr lang="fr-FR" sz="1400" b="0" i="1" smtClean="0">
+                                  <a:latin typeface="Cambria Math"/>
+                                </a:rPr>
+                              </m:ctrlPr>
+                            </m:sSubPr>
+                            <m:e>
+                              <m:r>
+                                <a:rPr lang="fr-FR" sz="1400" b="0" i="1" smtClean="0">
+                                  <a:latin typeface="Cambria Math"/>
+                                </a:rPr>
+                                <m:t>𝑘</m:t>
+                              </m:r>
+                            </m:e>
+                            <m:sub>
+                              <m:r>
+                                <a:rPr lang="fr-FR" sz="1400" b="0" i="1" smtClean="0">
+                                  <a:latin typeface="Cambria Math"/>
+                                </a:rPr>
+                                <m:t>1</m:t>
+                              </m:r>
+                            </m:sub>
+                          </m:sSub>
+                        </m:e>
+                      </m:acc>
+                    </m:oMath>
+                  </m:oMathPara>
+                </a14:m>
+                <a:endParaRPr lang="fr-FR" sz="1400" dirty="0"/>
+              </a:p>
+            </p:txBody>
+          </p:sp>
+        </mc:Choice>
+        <mc:Fallback>
+          <p:sp>
+            <p:nvSpPr>
+              <p:cNvPr id="49" name="ZoneTexte 48"/>
+              <p:cNvSpPr txBox="1">
+                <a:spLocks noRot="1" noChangeAspect="1" noMove="1" noResize="1" noEditPoints="1" noAdjustHandles="1" noChangeArrowheads="1" noChangeShapeType="1" noTextEdit="1"/>
+              </p:cNvSpPr>
+              <p:nvPr/>
+            </p:nvSpPr>
+            <p:spPr>
+              <a:xfrm>
+                <a:off x="2979041" y="1183434"/>
+                <a:ext cx="402738" cy="339645"/>
+              </a:xfrm>
+              <a:prstGeom prst="rect">
+                <a:avLst/>
+              </a:prstGeom>
+              <a:blipFill rotWithShape="1">
+                <a:blip r:embed="rId20"/>
+                <a:stretch>
+                  <a:fillRect/>
+                </a:stretch>
+              </a:blipFill>
+            </p:spPr>
+            <p:txBody>
+              <a:bodyPr/>
+              <a:lstStyle/>
+              <a:p>
+                <a:r>
+                  <a:rPr lang="fr-FR">
+                    <a:noFill/>
+                  </a:rPr>
+                  <a:t> </a:t>
+                </a:r>
+              </a:p>
+            </p:txBody>
+          </p:sp>
+        </mc:Fallback>
+      </mc:AlternateContent>
+      <mc:AlternateContent xmlns:mc="http://schemas.openxmlformats.org/markup-compatibility/2006">
+        <mc:Choice xmlns:a14="http://schemas.microsoft.com/office/drawing/2010/main" Requires="a14">
+          <p:sp>
+            <p:nvSpPr>
+              <p:cNvPr id="50" name="ZoneTexte 49"/>
+              <p:cNvSpPr txBox="1"/>
+              <p:nvPr/>
+            </p:nvSpPr>
+            <p:spPr>
+              <a:xfrm>
+                <a:off x="3838442" y="1117768"/>
+                <a:ext cx="406906" cy="339645"/>
+              </a:xfrm>
+              <a:prstGeom prst="rect">
+                <a:avLst/>
+              </a:prstGeom>
+              <a:noFill/>
+            </p:spPr>
+            <p:txBody>
+              <a:bodyPr wrap="none" rtlCol="0">
+                <a:spAutoFit/>
+              </a:bodyPr>
+              <a:lstStyle/>
+              <a:p>
+                <a14:m>
+                  <m:oMathPara xmlns:m="http://schemas.openxmlformats.org/officeDocument/2006/math">
+                    <m:oMathParaPr>
+                      <m:jc m:val="centerGroup"/>
+                    </m:oMathParaPr>
+                    <m:oMath xmlns:m="http://schemas.openxmlformats.org/officeDocument/2006/math">
+                      <m:acc>
+                        <m:accPr>
+                          <m:chr m:val="⃗"/>
+                          <m:ctrlPr>
+                            <a:rPr lang="fr-FR" sz="1400" i="1" smtClean="0">
+                              <a:latin typeface="Cambria Math"/>
+                            </a:rPr>
+                          </m:ctrlPr>
+                        </m:accPr>
+                        <m:e>
+                          <m:sSub>
+                            <m:sSubPr>
+                              <m:ctrlPr>
+                                <a:rPr lang="fr-FR" sz="1400" b="0" i="1" smtClean="0">
+                                  <a:latin typeface="Cambria Math"/>
+                                </a:rPr>
+                              </m:ctrlPr>
+                            </m:sSubPr>
+                            <m:e>
+                              <m:r>
+                                <a:rPr lang="fr-FR" sz="1400" b="0" i="1" smtClean="0">
+                                  <a:latin typeface="Cambria Math"/>
+                                </a:rPr>
+                                <m:t>𝑘</m:t>
+                              </m:r>
+                            </m:e>
+                            <m:sub>
+                              <m:r>
+                                <a:rPr lang="fr-FR" sz="1400" b="0" i="1" smtClean="0">
+                                  <a:latin typeface="Cambria Math"/>
+                                </a:rPr>
+                                <m:t>0</m:t>
+                              </m:r>
+                            </m:sub>
+                          </m:sSub>
+                        </m:e>
+                      </m:acc>
+                    </m:oMath>
+                  </m:oMathPara>
+                </a14:m>
+                <a:endParaRPr lang="fr-FR" sz="1400" dirty="0"/>
+              </a:p>
+            </p:txBody>
+          </p:sp>
+        </mc:Choice>
+        <mc:Fallback>
+          <p:sp>
+            <p:nvSpPr>
+              <p:cNvPr id="50" name="ZoneTexte 49"/>
+              <p:cNvSpPr txBox="1">
+                <a:spLocks noRot="1" noChangeAspect="1" noMove="1" noResize="1" noEditPoints="1" noAdjustHandles="1" noChangeArrowheads="1" noChangeShapeType="1" noTextEdit="1"/>
+              </p:cNvSpPr>
+              <p:nvPr/>
+            </p:nvSpPr>
+            <p:spPr>
+              <a:xfrm>
+                <a:off x="3838442" y="1117768"/>
+                <a:ext cx="406906" cy="339645"/>
+              </a:xfrm>
+              <a:prstGeom prst="rect">
+                <a:avLst/>
+              </a:prstGeom>
+              <a:blipFill rotWithShape="1">
+                <a:blip r:embed="rId21"/>
+                <a:stretch>
+                  <a:fillRect/>
+                </a:stretch>
+              </a:blipFill>
+            </p:spPr>
+            <p:txBody>
+              <a:bodyPr/>
+              <a:lstStyle/>
+              <a:p>
+                <a:r>
+                  <a:rPr lang="fr-FR">
+                    <a:noFill/>
+                  </a:rPr>
+                  <a:t> </a:t>
+                </a:r>
+              </a:p>
+            </p:txBody>
+          </p:sp>
+        </mc:Fallback>
+      </mc:AlternateContent>
     </p:spTree>
     <p:extLst>
       <p:ext uri="{BB962C8B-B14F-4D97-AF65-F5344CB8AC3E}">
-        <p14:creationId xmlns:p14="http://schemas.microsoft.com/office/powerpoint/2010/main" val="2531318778"/>
+        <p14:creationId xmlns:p14="http://schemas.microsoft.com/office/powerpoint/2010/main" val="2105886169"/>
       </p:ext>
     </p:extLst>
   </p:cSld>
@@ -3671,6 +5527,1172 @@
 </file>
 
 <file path=ppt/slides/slide10.xml><?xml version="1.0" encoding="utf-8"?>
+<p:sld xmlns:a="http://schemas.openxmlformats.org/drawingml/2006/main" xmlns:r="http://schemas.openxmlformats.org/officeDocument/2006/relationships" xmlns:p="http://schemas.openxmlformats.org/presentationml/2006/main">
+  <p:cSld>
+    <p:spTree>
+      <p:nvGrpSpPr>
+        <p:cNvPr id="1" name=""/>
+        <p:cNvGrpSpPr/>
+        <p:nvPr/>
+      </p:nvGrpSpPr>
+      <p:grpSpPr>
+        <a:xfrm>
+          <a:off x="0" y="0"/>
+          <a:ext cx="0" cy="0"/>
+          <a:chOff x="0" y="0"/>
+          <a:chExt cx="0" cy="0"/>
+        </a:xfrm>
+      </p:grpSpPr>
+      <mc:AlternateContent xmlns:mc="http://schemas.openxmlformats.org/markup-compatibility/2006" xmlns:a14="http://schemas.microsoft.com/office/drawing/2010/main">
+        <mc:Choice Requires="a14">
+          <p:sp>
+            <p:nvSpPr>
+              <p:cNvPr id="34" name="ZoneTexte 33"/>
+              <p:cNvSpPr txBox="1"/>
+              <p:nvPr/>
+            </p:nvSpPr>
+            <p:spPr>
+              <a:xfrm>
+                <a:off x="6012160" y="1268759"/>
+                <a:ext cx="362022" cy="276999"/>
+              </a:xfrm>
+              <a:prstGeom prst="rect">
+                <a:avLst/>
+              </a:prstGeom>
+              <a:noFill/>
+            </p:spPr>
+            <p:txBody>
+              <a:bodyPr wrap="none" rtlCol="0">
+                <a:spAutoFit/>
+              </a:bodyPr>
+              <a:lstStyle/>
+              <a:p>
+                <a:pPr/>
+                <a14:m>
+                  <m:oMathPara xmlns:m="http://schemas.openxmlformats.org/officeDocument/2006/math">
+                    <m:oMathParaPr>
+                      <m:jc m:val="centerGroup"/>
+                    </m:oMathParaPr>
+                    <m:oMath xmlns:m="http://schemas.openxmlformats.org/officeDocument/2006/math">
+                      <m:acc>
+                        <m:accPr>
+                          <m:chr m:val="⃗"/>
+                          <m:ctrlPr>
+                            <a:rPr lang="fr-FR" sz="1200" i="1" smtClean="0">
+                              <a:latin typeface="Cambria Math"/>
+                            </a:rPr>
+                          </m:ctrlPr>
+                        </m:accPr>
+                        <m:e>
+                          <m:sSub>
+                            <m:sSubPr>
+                              <m:ctrlPr>
+                                <a:rPr lang="fr-FR" sz="1200" i="1" smtClean="0">
+                                  <a:latin typeface="Cambria Math"/>
+                                </a:rPr>
+                              </m:ctrlPr>
+                            </m:sSubPr>
+                            <m:e>
+                              <m:r>
+                                <a:rPr lang="fr-FR" sz="1200" b="0" i="1" smtClean="0">
+                                  <a:latin typeface="Cambria Math"/>
+                                </a:rPr>
+                                <m:t>𝑧</m:t>
+                              </m:r>
+                            </m:e>
+                            <m:sub>
+                              <m:r>
+                                <a:rPr lang="fr-FR" sz="1200" b="0" i="1" smtClean="0">
+                                  <a:latin typeface="Cambria Math"/>
+                                </a:rPr>
+                                <m:t>0</m:t>
+                              </m:r>
+                            </m:sub>
+                          </m:sSub>
+                        </m:e>
+                      </m:acc>
+                    </m:oMath>
+                  </m:oMathPara>
+                </a14:m>
+                <a:endParaRPr lang="fr-FR" sz="1200" dirty="0"/>
+              </a:p>
+            </p:txBody>
+          </p:sp>
+        </mc:Choice>
+        <mc:Fallback xmlns="">
+          <p:sp>
+            <p:nvSpPr>
+              <p:cNvPr id="34" name="ZoneTexte 33"/>
+              <p:cNvSpPr txBox="1">
+                <a:spLocks noRot="1" noChangeAspect="1" noMove="1" noResize="1" noEditPoints="1" noAdjustHandles="1" noChangeArrowheads="1" noChangeShapeType="1" noTextEdit="1"/>
+              </p:cNvSpPr>
+              <p:nvPr/>
+            </p:nvSpPr>
+            <p:spPr>
+              <a:xfrm>
+                <a:off x="6012160" y="1268759"/>
+                <a:ext cx="362022" cy="276999"/>
+              </a:xfrm>
+              <a:prstGeom prst="rect">
+                <a:avLst/>
+              </a:prstGeom>
+              <a:blipFill rotWithShape="1">
+                <a:blip r:embed="rId2"/>
+                <a:stretch>
+                  <a:fillRect/>
+                </a:stretch>
+              </a:blipFill>
+            </p:spPr>
+            <p:txBody>
+              <a:bodyPr/>
+              <a:lstStyle/>
+              <a:p>
+                <a:r>
+                  <a:rPr lang="fr-FR">
+                    <a:noFill/>
+                  </a:rPr>
+                  <a:t> </a:t>
+                </a:r>
+              </a:p>
+            </p:txBody>
+          </p:sp>
+        </mc:Fallback>
+      </mc:AlternateContent>
+      <p:grpSp>
+        <p:nvGrpSpPr>
+          <p:cNvPr id="35" name="Groupe 34"/>
+          <p:cNvGrpSpPr/>
+          <p:nvPr/>
+        </p:nvGrpSpPr>
+        <p:grpSpPr>
+          <a:xfrm>
+            <a:off x="5288179" y="548679"/>
+            <a:ext cx="734014" cy="720080"/>
+            <a:chOff x="971600" y="548680"/>
+            <a:chExt cx="734014" cy="720080"/>
+          </a:xfrm>
+        </p:grpSpPr>
+        <p:cxnSp>
+          <p:nvCxnSpPr>
+            <p:cNvPr id="36" name="Connecteur droit avec flèche 35"/>
+            <p:cNvCxnSpPr/>
+            <p:nvPr/>
+          </p:nvCxnSpPr>
+          <p:spPr>
+            <a:xfrm>
+              <a:off x="971600" y="1268760"/>
+              <a:ext cx="734014" cy="0"/>
+            </a:xfrm>
+            <a:prstGeom prst="straightConnector1">
+              <a:avLst/>
+            </a:prstGeom>
+            <a:ln w="12700">
+              <a:solidFill>
+                <a:schemeClr val="bg1">
+                  <a:lumMod val="50000"/>
+                </a:schemeClr>
+              </a:solidFill>
+              <a:tailEnd type="triangle" w="sm" len="lg"/>
+            </a:ln>
+          </p:spPr>
+          <p:style>
+            <a:lnRef idx="1">
+              <a:schemeClr val="accent1"/>
+            </a:lnRef>
+            <a:fillRef idx="0">
+              <a:schemeClr val="accent1"/>
+            </a:fillRef>
+            <a:effectRef idx="0">
+              <a:schemeClr val="accent1"/>
+            </a:effectRef>
+            <a:fontRef idx="minor">
+              <a:schemeClr val="tx1"/>
+            </a:fontRef>
+          </p:style>
+        </p:cxnSp>
+        <p:cxnSp>
+          <p:nvCxnSpPr>
+            <p:cNvPr id="37" name="Connecteur droit avec flèche 36"/>
+            <p:cNvCxnSpPr/>
+            <p:nvPr/>
+          </p:nvCxnSpPr>
+          <p:spPr>
+            <a:xfrm flipV="1">
+              <a:off x="971600" y="548680"/>
+              <a:ext cx="0" cy="720080"/>
+            </a:xfrm>
+            <a:prstGeom prst="straightConnector1">
+              <a:avLst/>
+            </a:prstGeom>
+            <a:ln w="12700">
+              <a:solidFill>
+                <a:schemeClr val="bg1">
+                  <a:lumMod val="50000"/>
+                </a:schemeClr>
+              </a:solidFill>
+              <a:tailEnd type="triangle" w="sm" len="lg"/>
+            </a:ln>
+          </p:spPr>
+          <p:style>
+            <a:lnRef idx="1">
+              <a:schemeClr val="accent1"/>
+            </a:lnRef>
+            <a:fillRef idx="0">
+              <a:schemeClr val="accent1"/>
+            </a:fillRef>
+            <a:effectRef idx="0">
+              <a:schemeClr val="accent1"/>
+            </a:effectRef>
+            <a:fontRef idx="minor">
+              <a:schemeClr val="tx1"/>
+            </a:fontRef>
+          </p:style>
+        </p:cxnSp>
+      </p:grpSp>
+      <p:grpSp>
+        <p:nvGrpSpPr>
+          <p:cNvPr id="38" name="Groupe 37"/>
+          <p:cNvGrpSpPr/>
+          <p:nvPr/>
+        </p:nvGrpSpPr>
+        <p:grpSpPr>
+          <a:xfrm rot="20700000">
+            <a:off x="5179262" y="465959"/>
+            <a:ext cx="734014" cy="720080"/>
+            <a:chOff x="971600" y="548680"/>
+            <a:chExt cx="734014" cy="720080"/>
+          </a:xfrm>
+        </p:grpSpPr>
+        <p:cxnSp>
+          <p:nvCxnSpPr>
+            <p:cNvPr id="39" name="Connecteur droit avec flèche 38"/>
+            <p:cNvCxnSpPr/>
+            <p:nvPr/>
+          </p:nvCxnSpPr>
+          <p:spPr>
+            <a:xfrm>
+              <a:off x="971600" y="1268760"/>
+              <a:ext cx="734014" cy="0"/>
+            </a:xfrm>
+            <a:prstGeom prst="straightConnector1">
+              <a:avLst/>
+            </a:prstGeom>
+            <a:ln w="12700">
+              <a:solidFill>
+                <a:srgbClr val="FF0000"/>
+              </a:solidFill>
+              <a:tailEnd type="triangle" w="sm" len="lg"/>
+            </a:ln>
+          </p:spPr>
+          <p:style>
+            <a:lnRef idx="1">
+              <a:schemeClr val="accent1"/>
+            </a:lnRef>
+            <a:fillRef idx="0">
+              <a:schemeClr val="accent1"/>
+            </a:fillRef>
+            <a:effectRef idx="0">
+              <a:schemeClr val="accent1"/>
+            </a:effectRef>
+            <a:fontRef idx="minor">
+              <a:schemeClr val="tx1"/>
+            </a:fontRef>
+          </p:style>
+        </p:cxnSp>
+        <p:cxnSp>
+          <p:nvCxnSpPr>
+            <p:cNvPr id="40" name="Connecteur droit avec flèche 39"/>
+            <p:cNvCxnSpPr/>
+            <p:nvPr/>
+          </p:nvCxnSpPr>
+          <p:spPr>
+            <a:xfrm flipV="1">
+              <a:off x="971600" y="548680"/>
+              <a:ext cx="0" cy="720080"/>
+            </a:xfrm>
+            <a:prstGeom prst="straightConnector1">
+              <a:avLst/>
+            </a:prstGeom>
+            <a:ln w="12700">
+              <a:solidFill>
+                <a:srgbClr val="FF0000"/>
+              </a:solidFill>
+              <a:tailEnd type="triangle" w="sm" len="lg"/>
+            </a:ln>
+          </p:spPr>
+          <p:style>
+            <a:lnRef idx="1">
+              <a:schemeClr val="accent1"/>
+            </a:lnRef>
+            <a:fillRef idx="0">
+              <a:schemeClr val="accent1"/>
+            </a:fillRef>
+            <a:effectRef idx="0">
+              <a:schemeClr val="accent1"/>
+            </a:effectRef>
+            <a:fontRef idx="minor">
+              <a:schemeClr val="tx1"/>
+            </a:fontRef>
+          </p:style>
+        </p:cxnSp>
+      </p:grpSp>
+      <mc:AlternateContent xmlns:mc="http://schemas.openxmlformats.org/markup-compatibility/2006" xmlns:a14="http://schemas.microsoft.com/office/drawing/2010/main">
+        <mc:Choice Requires="a14">
+          <p:sp>
+            <p:nvSpPr>
+              <p:cNvPr id="41" name="ZoneTexte 40"/>
+              <p:cNvSpPr txBox="1"/>
+              <p:nvPr/>
+            </p:nvSpPr>
+            <p:spPr>
+              <a:xfrm>
+                <a:off x="6013394" y="836712"/>
+                <a:ext cx="362022" cy="276999"/>
+              </a:xfrm>
+              <a:prstGeom prst="rect">
+                <a:avLst/>
+              </a:prstGeom>
+              <a:noFill/>
+            </p:spPr>
+            <p:txBody>
+              <a:bodyPr wrap="none" rtlCol="0">
+                <a:spAutoFit/>
+              </a:bodyPr>
+              <a:lstStyle/>
+              <a:p>
+                <a:pPr/>
+                <a14:m>
+                  <m:oMathPara xmlns:m="http://schemas.openxmlformats.org/officeDocument/2006/math">
+                    <m:oMathParaPr>
+                      <m:jc m:val="centerGroup"/>
+                    </m:oMathParaPr>
+                    <m:oMath xmlns:m="http://schemas.openxmlformats.org/officeDocument/2006/math">
+                      <m:acc>
+                        <m:accPr>
+                          <m:chr m:val="⃗"/>
+                          <m:ctrlPr>
+                            <a:rPr lang="fr-FR" sz="1200" i="1" smtClean="0">
+                              <a:latin typeface="Cambria Math"/>
+                            </a:rPr>
+                          </m:ctrlPr>
+                        </m:accPr>
+                        <m:e>
+                          <m:sSub>
+                            <m:sSubPr>
+                              <m:ctrlPr>
+                                <a:rPr lang="fr-FR" sz="1200" i="1" smtClean="0">
+                                  <a:latin typeface="Cambria Math"/>
+                                </a:rPr>
+                              </m:ctrlPr>
+                            </m:sSubPr>
+                            <m:e>
+                              <m:r>
+                                <a:rPr lang="fr-FR" sz="1200" b="0" i="1" smtClean="0">
+                                  <a:latin typeface="Cambria Math"/>
+                                </a:rPr>
+                                <m:t>𝑧</m:t>
+                              </m:r>
+                            </m:e>
+                            <m:sub>
+                              <m:r>
+                                <a:rPr lang="fr-FR" sz="1200" b="0" i="1" smtClean="0">
+                                  <a:latin typeface="Cambria Math"/>
+                                </a:rPr>
+                                <m:t>4</m:t>
+                              </m:r>
+                            </m:sub>
+                          </m:sSub>
+                        </m:e>
+                      </m:acc>
+                    </m:oMath>
+                  </m:oMathPara>
+                </a14:m>
+                <a:endParaRPr lang="fr-FR" sz="1200" dirty="0"/>
+              </a:p>
+            </p:txBody>
+          </p:sp>
+        </mc:Choice>
+        <mc:Fallback xmlns="">
+          <p:sp>
+            <p:nvSpPr>
+              <p:cNvPr id="41" name="ZoneTexte 40"/>
+              <p:cNvSpPr txBox="1">
+                <a:spLocks noRot="1" noChangeAspect="1" noMove="1" noResize="1" noEditPoints="1" noAdjustHandles="1" noChangeArrowheads="1" noChangeShapeType="1" noTextEdit="1"/>
+              </p:cNvSpPr>
+              <p:nvPr/>
+            </p:nvSpPr>
+            <p:spPr>
+              <a:xfrm>
+                <a:off x="6013394" y="836712"/>
+                <a:ext cx="362022" cy="276999"/>
+              </a:xfrm>
+              <a:prstGeom prst="rect">
+                <a:avLst/>
+              </a:prstGeom>
+              <a:blipFill rotWithShape="1">
+                <a:blip r:embed="rId3"/>
+                <a:stretch>
+                  <a:fillRect/>
+                </a:stretch>
+              </a:blipFill>
+            </p:spPr>
+            <p:txBody>
+              <a:bodyPr/>
+              <a:lstStyle/>
+              <a:p>
+                <a:r>
+                  <a:rPr lang="fr-FR">
+                    <a:noFill/>
+                  </a:rPr>
+                  <a:t> </a:t>
+                </a:r>
+              </a:p>
+            </p:txBody>
+          </p:sp>
+        </mc:Fallback>
+      </mc:AlternateContent>
+      <mc:AlternateContent xmlns:mc="http://schemas.openxmlformats.org/markup-compatibility/2006" xmlns:a14="http://schemas.microsoft.com/office/drawing/2010/main">
+        <mc:Choice Requires="a14">
+          <p:sp>
+            <p:nvSpPr>
+              <p:cNvPr id="42" name="ZoneTexte 41"/>
+              <p:cNvSpPr txBox="1"/>
+              <p:nvPr/>
+            </p:nvSpPr>
+            <p:spPr>
+              <a:xfrm>
+                <a:off x="5114730" y="1290070"/>
+                <a:ext cx="722313" cy="276999"/>
+              </a:xfrm>
+              <a:prstGeom prst="rect">
+                <a:avLst/>
+              </a:prstGeom>
+              <a:noFill/>
+            </p:spPr>
+            <p:txBody>
+              <a:bodyPr wrap="none" rtlCol="0">
+                <a:spAutoFit/>
+              </a:bodyPr>
+              <a:lstStyle/>
+              <a:p>
+                <a:pPr/>
+                <a14:m>
+                  <m:oMathPara xmlns:m="http://schemas.openxmlformats.org/officeDocument/2006/math">
+                    <m:oMathParaPr>
+                      <m:jc m:val="centerGroup"/>
+                    </m:oMathParaPr>
+                    <m:oMath xmlns:m="http://schemas.openxmlformats.org/officeDocument/2006/math">
+                      <m:acc>
+                        <m:accPr>
+                          <m:chr m:val="⃗"/>
+                          <m:ctrlPr>
+                            <a:rPr lang="fr-FR" sz="1200" i="1" smtClean="0">
+                              <a:latin typeface="Cambria Math"/>
+                            </a:rPr>
+                          </m:ctrlPr>
+                        </m:accPr>
+                        <m:e>
+                          <m:sSub>
+                            <m:sSubPr>
+                              <m:ctrlPr>
+                                <a:rPr lang="fr-FR" sz="1200" i="1" smtClean="0">
+                                  <a:latin typeface="Cambria Math"/>
+                                </a:rPr>
+                              </m:ctrlPr>
+                            </m:sSubPr>
+                            <m:e>
+                              <m:r>
+                                <a:rPr lang="fr-FR" sz="1200" b="0" i="1" smtClean="0">
+                                  <a:latin typeface="Cambria Math"/>
+                                </a:rPr>
+                                <m:t>𝑦</m:t>
+                              </m:r>
+                            </m:e>
+                            <m:sub>
+                              <m:r>
+                                <a:rPr lang="fr-FR" sz="1200" b="0" i="1" smtClean="0">
+                                  <a:latin typeface="Cambria Math"/>
+                                </a:rPr>
+                                <m:t>0</m:t>
+                              </m:r>
+                            </m:sub>
+                          </m:sSub>
+                        </m:e>
+                      </m:acc>
+                      <m:r>
+                        <a:rPr lang="fr-FR" sz="1200" b="0" i="1" smtClean="0">
+                          <a:latin typeface="Cambria Math"/>
+                        </a:rPr>
+                        <m:t>=</m:t>
+                      </m:r>
+                      <m:acc>
+                        <m:accPr>
+                          <m:chr m:val="⃗"/>
+                          <m:ctrlPr>
+                            <a:rPr lang="fr-FR" sz="1200" b="0" i="1" smtClean="0">
+                              <a:latin typeface="Cambria Math"/>
+                            </a:rPr>
+                          </m:ctrlPr>
+                        </m:accPr>
+                        <m:e>
+                          <m:sSub>
+                            <m:sSubPr>
+                              <m:ctrlPr>
+                                <a:rPr lang="fr-FR" sz="1200" b="0" i="1" smtClean="0">
+                                  <a:latin typeface="Cambria Math"/>
+                                </a:rPr>
+                              </m:ctrlPr>
+                            </m:sSubPr>
+                            <m:e>
+                              <m:r>
+                                <a:rPr lang="fr-FR" sz="1200" b="0" i="1" smtClean="0">
+                                  <a:latin typeface="Cambria Math"/>
+                                </a:rPr>
+                                <m:t>𝑦</m:t>
+                              </m:r>
+                            </m:e>
+                            <m:sub>
+                              <m:r>
+                                <a:rPr lang="fr-FR" sz="1200" b="0" i="1" smtClean="0">
+                                  <a:latin typeface="Cambria Math"/>
+                                </a:rPr>
+                                <m:t>4</m:t>
+                              </m:r>
+                            </m:sub>
+                          </m:sSub>
+                        </m:e>
+                      </m:acc>
+                    </m:oMath>
+                  </m:oMathPara>
+                </a14:m>
+                <a:endParaRPr lang="fr-FR" sz="1200" dirty="0"/>
+              </a:p>
+            </p:txBody>
+          </p:sp>
+        </mc:Choice>
+        <mc:Fallback xmlns="">
+          <p:sp>
+            <p:nvSpPr>
+              <p:cNvPr id="42" name="ZoneTexte 41"/>
+              <p:cNvSpPr txBox="1">
+                <a:spLocks noRot="1" noChangeAspect="1" noMove="1" noResize="1" noEditPoints="1" noAdjustHandles="1" noChangeArrowheads="1" noChangeShapeType="1" noTextEdit="1"/>
+              </p:cNvSpPr>
+              <p:nvPr/>
+            </p:nvSpPr>
+            <p:spPr>
+              <a:xfrm>
+                <a:off x="5114730" y="1290070"/>
+                <a:ext cx="722313" cy="276999"/>
+              </a:xfrm>
+              <a:prstGeom prst="rect">
+                <a:avLst/>
+              </a:prstGeom>
+              <a:blipFill rotWithShape="1">
+                <a:blip r:embed="rId4"/>
+                <a:stretch>
+                  <a:fillRect/>
+                </a:stretch>
+              </a:blipFill>
+            </p:spPr>
+            <p:txBody>
+              <a:bodyPr/>
+              <a:lstStyle/>
+              <a:p>
+                <a:r>
+                  <a:rPr lang="fr-FR">
+                    <a:noFill/>
+                  </a:rPr>
+                  <a:t> </a:t>
+                </a:r>
+              </a:p>
+            </p:txBody>
+          </p:sp>
+        </mc:Fallback>
+      </mc:AlternateContent>
+      <mc:AlternateContent xmlns:mc="http://schemas.openxmlformats.org/markup-compatibility/2006" xmlns:a14="http://schemas.microsoft.com/office/drawing/2010/main">
+        <mc:Choice Requires="a14">
+          <p:sp>
+            <p:nvSpPr>
+              <p:cNvPr id="43" name="ZoneTexte 42"/>
+              <p:cNvSpPr txBox="1"/>
+              <p:nvPr/>
+            </p:nvSpPr>
+            <p:spPr>
+              <a:xfrm>
+                <a:off x="4821409" y="271679"/>
+                <a:ext cx="372345" cy="276999"/>
+              </a:xfrm>
+              <a:prstGeom prst="rect">
+                <a:avLst/>
+              </a:prstGeom>
+              <a:noFill/>
+            </p:spPr>
+            <p:txBody>
+              <a:bodyPr wrap="none" rtlCol="0">
+                <a:spAutoFit/>
+              </a:bodyPr>
+              <a:lstStyle/>
+              <a:p>
+                <a:pPr/>
+                <a14:m>
+                  <m:oMathPara xmlns:m="http://schemas.openxmlformats.org/officeDocument/2006/math">
+                    <m:oMathParaPr>
+                      <m:jc m:val="centerGroup"/>
+                    </m:oMathParaPr>
+                    <m:oMath xmlns:m="http://schemas.openxmlformats.org/officeDocument/2006/math">
+                      <m:acc>
+                        <m:accPr>
+                          <m:chr m:val="⃗"/>
+                          <m:ctrlPr>
+                            <a:rPr lang="fr-FR" sz="1200" i="1" smtClean="0">
+                              <a:latin typeface="Cambria Math"/>
+                            </a:rPr>
+                          </m:ctrlPr>
+                        </m:accPr>
+                        <m:e>
+                          <m:sSub>
+                            <m:sSubPr>
+                              <m:ctrlPr>
+                                <a:rPr lang="fr-FR" sz="1200" b="0" i="1" smtClean="0">
+                                  <a:latin typeface="Cambria Math"/>
+                                </a:rPr>
+                              </m:ctrlPr>
+                            </m:sSubPr>
+                            <m:e>
+                              <m:r>
+                                <a:rPr lang="fr-FR" sz="1200" i="1" smtClean="0">
+                                  <a:latin typeface="Cambria Math"/>
+                                </a:rPr>
+                                <m:t>𝑥</m:t>
+                              </m:r>
+                            </m:e>
+                            <m:sub>
+                              <m:r>
+                                <a:rPr lang="fr-FR" sz="1200" b="0" i="1" smtClean="0">
+                                  <a:latin typeface="Cambria Math"/>
+                                </a:rPr>
+                                <m:t>4</m:t>
+                              </m:r>
+                            </m:sub>
+                          </m:sSub>
+                        </m:e>
+                      </m:acc>
+                    </m:oMath>
+                  </m:oMathPara>
+                </a14:m>
+                <a:endParaRPr lang="fr-FR" sz="1200" dirty="0"/>
+              </a:p>
+            </p:txBody>
+          </p:sp>
+        </mc:Choice>
+        <mc:Fallback xmlns="">
+          <p:sp>
+            <p:nvSpPr>
+              <p:cNvPr id="43" name="ZoneTexte 42"/>
+              <p:cNvSpPr txBox="1">
+                <a:spLocks noRot="1" noChangeAspect="1" noMove="1" noResize="1" noEditPoints="1" noAdjustHandles="1" noChangeArrowheads="1" noChangeShapeType="1" noTextEdit="1"/>
+              </p:cNvSpPr>
+              <p:nvPr/>
+            </p:nvSpPr>
+            <p:spPr>
+              <a:xfrm>
+                <a:off x="4821409" y="271679"/>
+                <a:ext cx="372345" cy="276999"/>
+              </a:xfrm>
+              <a:prstGeom prst="rect">
+                <a:avLst/>
+              </a:prstGeom>
+              <a:blipFill rotWithShape="1">
+                <a:blip r:embed="rId5"/>
+                <a:stretch>
+                  <a:fillRect/>
+                </a:stretch>
+              </a:blipFill>
+            </p:spPr>
+            <p:txBody>
+              <a:bodyPr/>
+              <a:lstStyle/>
+              <a:p>
+                <a:r>
+                  <a:rPr lang="fr-FR">
+                    <a:noFill/>
+                  </a:rPr>
+                  <a:t> </a:t>
+                </a:r>
+              </a:p>
+            </p:txBody>
+          </p:sp>
+        </mc:Fallback>
+      </mc:AlternateContent>
+      <p:sp>
+        <p:nvSpPr>
+          <p:cNvPr id="47" name="Arc 46"/>
+          <p:cNvSpPr/>
+          <p:nvPr/>
+        </p:nvSpPr>
+        <p:spPr>
+          <a:xfrm>
+            <a:off x="4731516" y="687180"/>
+            <a:ext cx="1113326" cy="1163158"/>
+          </a:xfrm>
+          <a:prstGeom prst="arc">
+            <a:avLst>
+              <a:gd name="adj1" fmla="val 20757849"/>
+              <a:gd name="adj2" fmla="val 21565869"/>
+            </a:avLst>
+          </a:prstGeom>
+          <a:ln>
+            <a:headEnd type="stealth" w="sm" len="med"/>
+            <a:tailEnd type="none" w="med" len="med"/>
+          </a:ln>
+        </p:spPr>
+        <p:style>
+          <a:lnRef idx="1">
+            <a:schemeClr val="accent1"/>
+          </a:lnRef>
+          <a:fillRef idx="0">
+            <a:schemeClr val="accent1"/>
+          </a:fillRef>
+          <a:effectRef idx="0">
+            <a:schemeClr val="accent1"/>
+          </a:effectRef>
+          <a:fontRef idx="minor">
+            <a:schemeClr val="tx1"/>
+          </a:fontRef>
+        </p:style>
+        <p:txBody>
+          <a:bodyPr rtlCol="0" anchor="ctr"/>
+          <a:lstStyle/>
+          <a:p>
+            <a:pPr algn="ctr"/>
+            <a:endParaRPr lang="fr-FR"/>
+          </a:p>
+        </p:txBody>
+      </p:sp>
+      <mc:AlternateContent xmlns:mc="http://schemas.openxmlformats.org/markup-compatibility/2006" xmlns:a14="http://schemas.microsoft.com/office/drawing/2010/main">
+        <mc:Choice Requires="a14">
+          <p:sp>
+            <p:nvSpPr>
+              <p:cNvPr id="51" name="ZoneTexte 50"/>
+              <p:cNvSpPr txBox="1"/>
+              <p:nvPr/>
+            </p:nvSpPr>
+            <p:spPr>
+              <a:xfrm>
+                <a:off x="5867535" y="1026535"/>
+                <a:ext cx="502253" cy="276999"/>
+              </a:xfrm>
+              <a:prstGeom prst="rect">
+                <a:avLst/>
+              </a:prstGeom>
+              <a:noFill/>
+            </p:spPr>
+            <p:txBody>
+              <a:bodyPr wrap="none" rtlCol="0">
+                <a:spAutoFit/>
+              </a:bodyPr>
+              <a:lstStyle/>
+              <a:p>
+                <a:pPr/>
+                <a14:m>
+                  <m:oMathPara xmlns:m="http://schemas.openxmlformats.org/officeDocument/2006/math">
+                    <m:oMathParaPr>
+                      <m:jc m:val="centerGroup"/>
+                    </m:oMathParaPr>
+                    <m:oMath xmlns:m="http://schemas.openxmlformats.org/officeDocument/2006/math">
+                      <m:r>
+                        <a:rPr lang="fr-FR" sz="1200" b="0" i="1" smtClean="0">
+                          <a:latin typeface="Cambria Math"/>
+                        </a:rPr>
+                        <m:t>𝛿</m:t>
+                      </m:r>
+                      <m:r>
+                        <a:rPr lang="fr-FR" sz="1200" b="0" i="1" smtClean="0">
+                          <a:latin typeface="Cambria Math"/>
+                        </a:rPr>
+                        <m:t>(</m:t>
+                      </m:r>
+                      <m:r>
+                        <a:rPr lang="fr-FR" sz="1200" b="0" i="1" smtClean="0">
+                          <a:latin typeface="Cambria Math"/>
+                        </a:rPr>
+                        <m:t>𝑡</m:t>
+                      </m:r>
+                      <m:r>
+                        <a:rPr lang="fr-FR" sz="1200" b="0" i="1" smtClean="0">
+                          <a:latin typeface="Cambria Math"/>
+                        </a:rPr>
+                        <m:t>)</m:t>
+                      </m:r>
+                    </m:oMath>
+                  </m:oMathPara>
+                </a14:m>
+                <a:endParaRPr lang="fr-FR" sz="1200" dirty="0"/>
+              </a:p>
+            </p:txBody>
+          </p:sp>
+        </mc:Choice>
+        <mc:Fallback xmlns="">
+          <p:sp>
+            <p:nvSpPr>
+              <p:cNvPr id="51" name="ZoneTexte 50"/>
+              <p:cNvSpPr txBox="1">
+                <a:spLocks noRot="1" noChangeAspect="1" noMove="1" noResize="1" noEditPoints="1" noAdjustHandles="1" noChangeArrowheads="1" noChangeShapeType="1" noTextEdit="1"/>
+              </p:cNvSpPr>
+              <p:nvPr/>
+            </p:nvSpPr>
+            <p:spPr>
+              <a:xfrm>
+                <a:off x="5867535" y="1026535"/>
+                <a:ext cx="502253" cy="276999"/>
+              </a:xfrm>
+              <a:prstGeom prst="rect">
+                <a:avLst/>
+              </a:prstGeom>
+              <a:blipFill rotWithShape="1">
+                <a:blip r:embed="rId6"/>
+                <a:stretch>
+                  <a:fillRect b="-6522"/>
+                </a:stretch>
+              </a:blipFill>
+            </p:spPr>
+            <p:txBody>
+              <a:bodyPr/>
+              <a:lstStyle/>
+              <a:p>
+                <a:r>
+                  <a:rPr lang="fr-FR">
+                    <a:noFill/>
+                  </a:rPr>
+                  <a:t> </a:t>
+                </a:r>
+              </a:p>
+            </p:txBody>
+          </p:sp>
+        </mc:Fallback>
+      </mc:AlternateContent>
+      <mc:AlternateContent xmlns:mc="http://schemas.openxmlformats.org/markup-compatibility/2006" xmlns:a14="http://schemas.microsoft.com/office/drawing/2010/main">
+        <mc:Choice Requires="a14">
+          <p:sp>
+            <p:nvSpPr>
+              <p:cNvPr id="52" name="ZoneTexte 51"/>
+              <p:cNvSpPr txBox="1"/>
+              <p:nvPr/>
+            </p:nvSpPr>
+            <p:spPr>
+              <a:xfrm>
+                <a:off x="5114730" y="1545758"/>
+                <a:ext cx="1255058" cy="300595"/>
+              </a:xfrm>
+              <a:prstGeom prst="rect">
+                <a:avLst/>
+              </a:prstGeom>
+              <a:noFill/>
+            </p:spPr>
+            <p:txBody>
+              <a:bodyPr wrap="square" rtlCol="0">
+                <a:spAutoFit/>
+              </a:bodyPr>
+              <a:lstStyle/>
+              <a:p>
+                <a:pPr/>
+                <a14:m>
+                  <m:oMathPara xmlns:m="http://schemas.openxmlformats.org/officeDocument/2006/math">
+                    <m:oMathParaPr>
+                      <m:jc m:val="centerGroup"/>
+                    </m:oMathParaPr>
+                    <m:oMath xmlns:m="http://schemas.openxmlformats.org/officeDocument/2006/math">
+                      <m:acc>
+                        <m:accPr>
+                          <m:chr m:val="⃗"/>
+                          <m:ctrlPr>
+                            <a:rPr lang="fr-FR" sz="1200" i="1" smtClean="0">
+                              <a:latin typeface="Cambria Math"/>
+                            </a:rPr>
+                          </m:ctrlPr>
+                        </m:accPr>
+                        <m:e>
+                          <m:sSub>
+                            <m:sSubPr>
+                              <m:ctrlPr>
+                                <a:rPr lang="fr-FR" sz="1200" b="0" i="1" smtClean="0">
+                                  <a:latin typeface="Cambria Math"/>
+                                </a:rPr>
+                              </m:ctrlPr>
+                            </m:sSubPr>
+                            <m:e>
+                              <m:r>
+                                <a:rPr lang="fr-FR" sz="1200" b="0" i="1" smtClean="0">
+                                  <a:latin typeface="Cambria Math"/>
+                                </a:rPr>
+                                <m:t>𝑂</m:t>
+                              </m:r>
+                            </m:e>
+                            <m:sub>
+                              <m:r>
+                                <a:rPr lang="fr-FR" sz="1200" b="0" i="1" smtClean="0">
+                                  <a:latin typeface="Cambria Math"/>
+                                </a:rPr>
+                                <m:t>3</m:t>
+                              </m:r>
+                            </m:sub>
+                          </m:sSub>
+                          <m:r>
+                            <a:rPr lang="fr-FR" sz="1200" b="0" i="1" smtClean="0">
+                              <a:latin typeface="Cambria Math"/>
+                            </a:rPr>
+                            <m:t>𝐴</m:t>
+                          </m:r>
+                        </m:e>
+                      </m:acc>
+                      <m:r>
+                        <a:rPr lang="fr-FR" sz="1200" b="0" i="1" smtClean="0">
+                          <a:latin typeface="Cambria Math"/>
+                        </a:rPr>
+                        <m:t>=</m:t>
+                      </m:r>
+                      <m:r>
+                        <a:rPr lang="fr-FR" sz="1200" b="0" i="1" smtClean="0">
+                          <a:latin typeface="Cambria Math"/>
+                        </a:rPr>
+                        <m:t>𝜆</m:t>
+                      </m:r>
+                      <m:d>
+                        <m:dPr>
+                          <m:ctrlPr>
+                            <a:rPr lang="fr-FR" sz="1200" b="0" i="1" smtClean="0">
+                              <a:latin typeface="Cambria Math"/>
+                            </a:rPr>
+                          </m:ctrlPr>
+                        </m:dPr>
+                        <m:e>
+                          <m:r>
+                            <a:rPr lang="fr-FR" sz="1200" b="0" i="1" smtClean="0">
+                              <a:latin typeface="Cambria Math"/>
+                            </a:rPr>
+                            <m:t>𝑡</m:t>
+                          </m:r>
+                        </m:e>
+                      </m:d>
+                      <m:r>
+                        <a:rPr lang="fr-FR" sz="1200" b="0" i="1" smtClean="0">
+                          <a:latin typeface="Cambria Math"/>
+                        </a:rPr>
+                        <m:t> </m:t>
+                      </m:r>
+                      <m:acc>
+                        <m:accPr>
+                          <m:chr m:val="⃗"/>
+                          <m:ctrlPr>
+                            <a:rPr lang="fr-FR" sz="1200" b="0" i="1" smtClean="0">
+                              <a:latin typeface="Cambria Math"/>
+                            </a:rPr>
+                          </m:ctrlPr>
+                        </m:accPr>
+                        <m:e>
+                          <m:sSub>
+                            <m:sSubPr>
+                              <m:ctrlPr>
+                                <a:rPr lang="fr-FR" sz="1200" b="0" i="1" smtClean="0">
+                                  <a:latin typeface="Cambria Math"/>
+                                </a:rPr>
+                              </m:ctrlPr>
+                            </m:sSubPr>
+                            <m:e>
+                              <m:r>
+                                <a:rPr lang="fr-FR" sz="1200" b="0" i="1" smtClean="0">
+                                  <a:latin typeface="Cambria Math"/>
+                                </a:rPr>
+                                <m:t>𝑦</m:t>
+                              </m:r>
+                            </m:e>
+                            <m:sub>
+                              <m:r>
+                                <a:rPr lang="fr-FR" sz="1200" b="0" i="1" smtClean="0">
+                                  <a:latin typeface="Cambria Math"/>
+                                </a:rPr>
+                                <m:t>0</m:t>
+                              </m:r>
+                            </m:sub>
+                          </m:sSub>
+                        </m:e>
+                      </m:acc>
+                    </m:oMath>
+                  </m:oMathPara>
+                </a14:m>
+                <a:endParaRPr lang="fr-FR" sz="1200" dirty="0"/>
+              </a:p>
+            </p:txBody>
+          </p:sp>
+        </mc:Choice>
+        <mc:Fallback xmlns="">
+          <p:sp>
+            <p:nvSpPr>
+              <p:cNvPr id="52" name="ZoneTexte 51"/>
+              <p:cNvSpPr txBox="1">
+                <a:spLocks noRot="1" noChangeAspect="1" noMove="1" noResize="1" noEditPoints="1" noAdjustHandles="1" noChangeArrowheads="1" noChangeShapeType="1" noTextEdit="1"/>
+              </p:cNvSpPr>
+              <p:nvPr/>
+            </p:nvSpPr>
+            <p:spPr>
+              <a:xfrm>
+                <a:off x="5114730" y="1545758"/>
+                <a:ext cx="1255058" cy="300595"/>
+              </a:xfrm>
+              <a:prstGeom prst="rect">
+                <a:avLst/>
+              </a:prstGeom>
+              <a:blipFill rotWithShape="1">
+                <a:blip r:embed="rId7"/>
+                <a:stretch>
+                  <a:fillRect/>
+                </a:stretch>
+              </a:blipFill>
+            </p:spPr>
+            <p:txBody>
+              <a:bodyPr/>
+              <a:lstStyle/>
+              <a:p>
+                <a:r>
+                  <a:rPr lang="fr-FR">
+                    <a:noFill/>
+                  </a:rPr>
+                  <a:t> </a:t>
+                </a:r>
+              </a:p>
+            </p:txBody>
+          </p:sp>
+        </mc:Fallback>
+      </mc:AlternateContent>
+      <mc:AlternateContent xmlns:mc="http://schemas.openxmlformats.org/markup-compatibility/2006" xmlns:a14="http://schemas.microsoft.com/office/drawing/2010/main">
+        <mc:Choice Requires="a14">
+          <p:sp>
+            <p:nvSpPr>
+              <p:cNvPr id="56" name="ZoneTexte 55"/>
+              <p:cNvSpPr txBox="1"/>
+              <p:nvPr/>
+            </p:nvSpPr>
+            <p:spPr>
+              <a:xfrm>
+                <a:off x="5121335" y="273513"/>
+                <a:ext cx="372345" cy="276999"/>
+              </a:xfrm>
+              <a:prstGeom prst="rect">
+                <a:avLst/>
+              </a:prstGeom>
+              <a:noFill/>
+            </p:spPr>
+            <p:txBody>
+              <a:bodyPr wrap="none" rtlCol="0">
+                <a:spAutoFit/>
+              </a:bodyPr>
+              <a:lstStyle/>
+              <a:p>
+                <a:pPr/>
+                <a14:m>
+                  <m:oMathPara xmlns:m="http://schemas.openxmlformats.org/officeDocument/2006/math">
+                    <m:oMathParaPr>
+                      <m:jc m:val="centerGroup"/>
+                    </m:oMathParaPr>
+                    <m:oMath xmlns:m="http://schemas.openxmlformats.org/officeDocument/2006/math">
+                      <m:acc>
+                        <m:accPr>
+                          <m:chr m:val="⃗"/>
+                          <m:ctrlPr>
+                            <a:rPr lang="fr-FR" sz="1200" i="1" smtClean="0">
+                              <a:latin typeface="Cambria Math"/>
+                            </a:rPr>
+                          </m:ctrlPr>
+                        </m:accPr>
+                        <m:e>
+                          <m:sSub>
+                            <m:sSubPr>
+                              <m:ctrlPr>
+                                <a:rPr lang="fr-FR" sz="1200" b="0" i="1" smtClean="0">
+                                  <a:latin typeface="Cambria Math"/>
+                                </a:rPr>
+                              </m:ctrlPr>
+                            </m:sSubPr>
+                            <m:e>
+                              <m:r>
+                                <a:rPr lang="fr-FR" sz="1200" i="1" smtClean="0">
+                                  <a:latin typeface="Cambria Math"/>
+                                </a:rPr>
+                                <m:t>𝑥</m:t>
+                              </m:r>
+                            </m:e>
+                            <m:sub>
+                              <m:r>
+                                <a:rPr lang="fr-FR" sz="1200" b="0" i="1" smtClean="0">
+                                  <a:latin typeface="Cambria Math"/>
+                                </a:rPr>
+                                <m:t>0</m:t>
+                              </m:r>
+                            </m:sub>
+                          </m:sSub>
+                        </m:e>
+                      </m:acc>
+                    </m:oMath>
+                  </m:oMathPara>
+                </a14:m>
+                <a:endParaRPr lang="fr-FR" sz="1200" dirty="0"/>
+              </a:p>
+            </p:txBody>
+          </p:sp>
+        </mc:Choice>
+        <mc:Fallback xmlns="">
+          <p:sp>
+            <p:nvSpPr>
+              <p:cNvPr id="56" name="ZoneTexte 55"/>
+              <p:cNvSpPr txBox="1">
+                <a:spLocks noRot="1" noChangeAspect="1" noMove="1" noResize="1" noEditPoints="1" noAdjustHandles="1" noChangeArrowheads="1" noChangeShapeType="1" noTextEdit="1"/>
+              </p:cNvSpPr>
+              <p:nvPr/>
+            </p:nvSpPr>
+            <p:spPr>
+              <a:xfrm>
+                <a:off x="5121335" y="273513"/>
+                <a:ext cx="372345" cy="276999"/>
+              </a:xfrm>
+              <a:prstGeom prst="rect">
+                <a:avLst/>
+              </a:prstGeom>
+              <a:blipFill rotWithShape="1">
+                <a:blip r:embed="rId8"/>
+                <a:stretch>
+                  <a:fillRect/>
+                </a:stretch>
+              </a:blipFill>
+            </p:spPr>
+            <p:txBody>
+              <a:bodyPr/>
+              <a:lstStyle/>
+              <a:p>
+                <a:r>
+                  <a:rPr lang="fr-FR">
+                    <a:noFill/>
+                  </a:rPr>
+                  <a:t> </a:t>
+                </a:r>
+              </a:p>
+            </p:txBody>
+          </p:sp>
+        </mc:Fallback>
+      </mc:AlternateContent>
+    </p:spTree>
+    <p:extLst>
+      <p:ext uri="{BB962C8B-B14F-4D97-AF65-F5344CB8AC3E}">
+        <p14:creationId xmlns:p14="http://schemas.microsoft.com/office/powerpoint/2010/main" val="1228224438"/>
+      </p:ext>
+    </p:extLst>
+  </p:cSld>
+  <p:clrMapOvr>
+    <a:masterClrMapping/>
+  </p:clrMapOvr>
+</p:sld>
+</file>
+
+<file path=ppt/slides/slide11.xml><?xml version="1.0" encoding="utf-8"?>
 <p:sld xmlns:a="http://schemas.openxmlformats.org/drawingml/2006/main" xmlns:r="http://schemas.openxmlformats.org/officeDocument/2006/relationships" xmlns:p="http://schemas.openxmlformats.org/presentationml/2006/main">
   <p:cSld>
     <p:spTree>
@@ -3871,7 +6893,7 @@
 </p:sld>
 </file>
 
-<file path=ppt/slides/slide11.xml><?xml version="1.0" encoding="utf-8"?>
+<file path=ppt/slides/slide12.xml><?xml version="1.0" encoding="utf-8"?>
 <p:sld xmlns:a="http://schemas.openxmlformats.org/drawingml/2006/main" xmlns:r="http://schemas.openxmlformats.org/officeDocument/2006/relationships" xmlns:p="http://schemas.openxmlformats.org/presentationml/2006/main">
   <p:cSld>
     <p:spTree>
@@ -4634,7 +7656,7 @@
 </p:sld>
 </file>
 
-<file path=ppt/slides/slide12.xml><?xml version="1.0" encoding="utf-8"?>
+<file path=ppt/slides/slide13.xml><?xml version="1.0" encoding="utf-8"?>
 <p:sld xmlns:a="http://schemas.openxmlformats.org/drawingml/2006/main" xmlns:r="http://schemas.openxmlformats.org/officeDocument/2006/relationships" xmlns:p="http://schemas.openxmlformats.org/presentationml/2006/main">
   <p:cSld>
     <p:spTree>
@@ -6311,6 +9333,66 @@
 </file>
 
 <file path=ppt/slides/slide2.xml><?xml version="1.0" encoding="utf-8"?>
+<p:sld xmlns:a="http://schemas.openxmlformats.org/drawingml/2006/main" xmlns:r="http://schemas.openxmlformats.org/officeDocument/2006/relationships" xmlns:p="http://schemas.openxmlformats.org/presentationml/2006/main">
+  <p:cSld>
+    <p:spTree>
+      <p:nvGrpSpPr>
+        <p:cNvPr id="1" name=""/>
+        <p:cNvGrpSpPr/>
+        <p:nvPr/>
+      </p:nvGrpSpPr>
+      <p:grpSpPr>
+        <a:xfrm>
+          <a:off x="0" y="0"/>
+          <a:ext cx="0" cy="0"/>
+          <a:chOff x="0" y="0"/>
+          <a:chExt cx="0" cy="0"/>
+        </a:xfrm>
+      </p:grpSpPr>
+      <p:pic>
+        <p:nvPicPr>
+          <p:cNvPr id="4" name="Image 3"/>
+          <p:cNvPicPr>
+            <a:picLocks noChangeAspect="1"/>
+          </p:cNvPicPr>
+          <p:nvPr/>
+        </p:nvPicPr>
+        <p:blipFill>
+          <a:blip r:embed="rId2">
+            <a:extLst>
+              <a:ext uri="{28A0092B-C50C-407E-A947-70E740481C1C}">
+                <a14:useLocalDpi xmlns:a14="http://schemas.microsoft.com/office/drawing/2010/main" val="0"/>
+              </a:ext>
+            </a:extLst>
+          </a:blip>
+          <a:stretch>
+            <a:fillRect/>
+          </a:stretch>
+        </p:blipFill>
+        <p:spPr>
+          <a:xfrm>
+            <a:off x="2572000" y="679793"/>
+            <a:ext cx="4000000" cy="5498413"/>
+          </a:xfrm>
+          <a:prstGeom prst="rect">
+            <a:avLst/>
+          </a:prstGeom>
+        </p:spPr>
+      </p:pic>
+    </p:spTree>
+    <p:extLst>
+      <p:ext uri="{BB962C8B-B14F-4D97-AF65-F5344CB8AC3E}">
+        <p14:creationId xmlns:p14="http://schemas.microsoft.com/office/powerpoint/2010/main" val="2531318778"/>
+      </p:ext>
+    </p:extLst>
+  </p:cSld>
+  <p:clrMapOvr>
+    <a:masterClrMapping/>
+  </p:clrMapOvr>
+</p:sld>
+</file>
+
+<file path=ppt/slides/slide3.xml><?xml version="1.0" encoding="utf-8"?>
 <p:sld xmlns:a="http://schemas.openxmlformats.org/drawingml/2006/main" xmlns:r="http://schemas.openxmlformats.org/officeDocument/2006/relationships" xmlns:p="http://schemas.openxmlformats.org/presentationml/2006/main">
   <p:cSld>
     <p:spTree>
@@ -8396,7 +11478,7 @@
 </p:sld>
 </file>
 
-<file path=ppt/slides/slide3.xml><?xml version="1.0" encoding="utf-8"?>
+<file path=ppt/slides/slide4.xml><?xml version="1.0" encoding="utf-8"?>
 <p:sld xmlns:a="http://schemas.openxmlformats.org/drawingml/2006/main" xmlns:r="http://schemas.openxmlformats.org/officeDocument/2006/relationships" xmlns:p="http://schemas.openxmlformats.org/presentationml/2006/main">
   <p:cSld>
     <p:spTree>
@@ -12361,7 +15443,7 @@
 </p:sld>
 </file>
 
-<file path=ppt/slides/slide4.xml><?xml version="1.0" encoding="utf-8"?>
+<file path=ppt/slides/slide5.xml><?xml version="1.0" encoding="utf-8"?>
 <p:sld xmlns:a="http://schemas.openxmlformats.org/drawingml/2006/main" xmlns:r="http://schemas.openxmlformats.org/officeDocument/2006/relationships" xmlns:p="http://schemas.openxmlformats.org/presentationml/2006/main">
   <p:cSld>
     <p:spTree>
@@ -15325,7 +18407,7 @@
 </p:sld>
 </file>
 
-<file path=ppt/slides/slide5.xml><?xml version="1.0" encoding="utf-8"?>
+<file path=ppt/slides/slide6.xml><?xml version="1.0" encoding="utf-8"?>
 <p:sld xmlns:a="http://schemas.openxmlformats.org/drawingml/2006/main" xmlns:r="http://schemas.openxmlformats.org/officeDocument/2006/relationships" xmlns:p="http://schemas.openxmlformats.org/presentationml/2006/main">
   <p:cSld>
     <p:spTree>
@@ -19330,7 +22412,7 @@
 </p:sld>
 </file>
 
-<file path=ppt/slides/slide6.xml><?xml version="1.0" encoding="utf-8"?>
+<file path=ppt/slides/slide7.xml><?xml version="1.0" encoding="utf-8"?>
 <p:sld xmlns:a="http://schemas.openxmlformats.org/drawingml/2006/main" xmlns:r="http://schemas.openxmlformats.org/officeDocument/2006/relationships" xmlns:p="http://schemas.openxmlformats.org/presentationml/2006/main">
   <p:cSld>
     <p:spTree>
@@ -20302,7 +23384,7 @@
 </p:sld>
 </file>
 
-<file path=ppt/slides/slide7.xml><?xml version="1.0" encoding="utf-8"?>
+<file path=ppt/slides/slide8.xml><?xml version="1.0" encoding="utf-8"?>
 <p:sld xmlns:a="http://schemas.openxmlformats.org/drawingml/2006/main" xmlns:r="http://schemas.openxmlformats.org/officeDocument/2006/relationships" xmlns:p="http://schemas.openxmlformats.org/presentationml/2006/main">
   <p:cSld>
     <p:spTree>
@@ -21271,7 +24353,7 @@
 </p:sld>
 </file>
 
-<file path=ppt/slides/slide8.xml><?xml version="1.0" encoding="utf-8"?>
+<file path=ppt/slides/slide9.xml><?xml version="1.0" encoding="utf-8"?>
 <p:sld xmlns:a="http://schemas.openxmlformats.org/drawingml/2006/main" xmlns:r="http://schemas.openxmlformats.org/officeDocument/2006/relationships" xmlns:p="http://schemas.openxmlformats.org/presentationml/2006/main">
   <p:cSld>
     <p:spTree>
@@ -22240,1172 +25322,6 @@
 </p:sld>
 </file>
 
-<file path=ppt/slides/slide9.xml><?xml version="1.0" encoding="utf-8"?>
-<p:sld xmlns:a="http://schemas.openxmlformats.org/drawingml/2006/main" xmlns:r="http://schemas.openxmlformats.org/officeDocument/2006/relationships" xmlns:p="http://schemas.openxmlformats.org/presentationml/2006/main">
-  <p:cSld>
-    <p:spTree>
-      <p:nvGrpSpPr>
-        <p:cNvPr id="1" name=""/>
-        <p:cNvGrpSpPr/>
-        <p:nvPr/>
-      </p:nvGrpSpPr>
-      <p:grpSpPr>
-        <a:xfrm>
-          <a:off x="0" y="0"/>
-          <a:ext cx="0" cy="0"/>
-          <a:chOff x="0" y="0"/>
-          <a:chExt cx="0" cy="0"/>
-        </a:xfrm>
-      </p:grpSpPr>
-      <mc:AlternateContent xmlns:mc="http://schemas.openxmlformats.org/markup-compatibility/2006" xmlns:a14="http://schemas.microsoft.com/office/drawing/2010/main">
-        <mc:Choice Requires="a14">
-          <p:sp>
-            <p:nvSpPr>
-              <p:cNvPr id="34" name="ZoneTexte 33"/>
-              <p:cNvSpPr txBox="1"/>
-              <p:nvPr/>
-            </p:nvSpPr>
-            <p:spPr>
-              <a:xfrm>
-                <a:off x="6012160" y="1268759"/>
-                <a:ext cx="362022" cy="276999"/>
-              </a:xfrm>
-              <a:prstGeom prst="rect">
-                <a:avLst/>
-              </a:prstGeom>
-              <a:noFill/>
-            </p:spPr>
-            <p:txBody>
-              <a:bodyPr wrap="none" rtlCol="0">
-                <a:spAutoFit/>
-              </a:bodyPr>
-              <a:lstStyle/>
-              <a:p>
-                <a:pPr/>
-                <a14:m>
-                  <m:oMathPara xmlns:m="http://schemas.openxmlformats.org/officeDocument/2006/math">
-                    <m:oMathParaPr>
-                      <m:jc m:val="centerGroup"/>
-                    </m:oMathParaPr>
-                    <m:oMath xmlns:m="http://schemas.openxmlformats.org/officeDocument/2006/math">
-                      <m:acc>
-                        <m:accPr>
-                          <m:chr m:val="⃗"/>
-                          <m:ctrlPr>
-                            <a:rPr lang="fr-FR" sz="1200" i="1" smtClean="0">
-                              <a:latin typeface="Cambria Math"/>
-                            </a:rPr>
-                          </m:ctrlPr>
-                        </m:accPr>
-                        <m:e>
-                          <m:sSub>
-                            <m:sSubPr>
-                              <m:ctrlPr>
-                                <a:rPr lang="fr-FR" sz="1200" i="1" smtClean="0">
-                                  <a:latin typeface="Cambria Math"/>
-                                </a:rPr>
-                              </m:ctrlPr>
-                            </m:sSubPr>
-                            <m:e>
-                              <m:r>
-                                <a:rPr lang="fr-FR" sz="1200" b="0" i="1" smtClean="0">
-                                  <a:latin typeface="Cambria Math"/>
-                                </a:rPr>
-                                <m:t>𝑧</m:t>
-                              </m:r>
-                            </m:e>
-                            <m:sub>
-                              <m:r>
-                                <a:rPr lang="fr-FR" sz="1200" b="0" i="1" smtClean="0">
-                                  <a:latin typeface="Cambria Math"/>
-                                </a:rPr>
-                                <m:t>0</m:t>
-                              </m:r>
-                            </m:sub>
-                          </m:sSub>
-                        </m:e>
-                      </m:acc>
-                    </m:oMath>
-                  </m:oMathPara>
-                </a14:m>
-                <a:endParaRPr lang="fr-FR" sz="1200" dirty="0"/>
-              </a:p>
-            </p:txBody>
-          </p:sp>
-        </mc:Choice>
-        <mc:Fallback xmlns="">
-          <p:sp>
-            <p:nvSpPr>
-              <p:cNvPr id="34" name="ZoneTexte 33"/>
-              <p:cNvSpPr txBox="1">
-                <a:spLocks noRot="1" noChangeAspect="1" noMove="1" noResize="1" noEditPoints="1" noAdjustHandles="1" noChangeArrowheads="1" noChangeShapeType="1" noTextEdit="1"/>
-              </p:cNvSpPr>
-              <p:nvPr/>
-            </p:nvSpPr>
-            <p:spPr>
-              <a:xfrm>
-                <a:off x="6012160" y="1268759"/>
-                <a:ext cx="362022" cy="276999"/>
-              </a:xfrm>
-              <a:prstGeom prst="rect">
-                <a:avLst/>
-              </a:prstGeom>
-              <a:blipFill rotWithShape="1">
-                <a:blip r:embed="rId2"/>
-                <a:stretch>
-                  <a:fillRect/>
-                </a:stretch>
-              </a:blipFill>
-            </p:spPr>
-            <p:txBody>
-              <a:bodyPr/>
-              <a:lstStyle/>
-              <a:p>
-                <a:r>
-                  <a:rPr lang="fr-FR">
-                    <a:noFill/>
-                  </a:rPr>
-                  <a:t> </a:t>
-                </a:r>
-              </a:p>
-            </p:txBody>
-          </p:sp>
-        </mc:Fallback>
-      </mc:AlternateContent>
-      <p:grpSp>
-        <p:nvGrpSpPr>
-          <p:cNvPr id="35" name="Groupe 34"/>
-          <p:cNvGrpSpPr/>
-          <p:nvPr/>
-        </p:nvGrpSpPr>
-        <p:grpSpPr>
-          <a:xfrm>
-            <a:off x="5288179" y="548679"/>
-            <a:ext cx="734014" cy="720080"/>
-            <a:chOff x="971600" y="548680"/>
-            <a:chExt cx="734014" cy="720080"/>
-          </a:xfrm>
-        </p:grpSpPr>
-        <p:cxnSp>
-          <p:nvCxnSpPr>
-            <p:cNvPr id="36" name="Connecteur droit avec flèche 35"/>
-            <p:cNvCxnSpPr/>
-            <p:nvPr/>
-          </p:nvCxnSpPr>
-          <p:spPr>
-            <a:xfrm>
-              <a:off x="971600" y="1268760"/>
-              <a:ext cx="734014" cy="0"/>
-            </a:xfrm>
-            <a:prstGeom prst="straightConnector1">
-              <a:avLst/>
-            </a:prstGeom>
-            <a:ln w="12700">
-              <a:solidFill>
-                <a:schemeClr val="bg1">
-                  <a:lumMod val="50000"/>
-                </a:schemeClr>
-              </a:solidFill>
-              <a:tailEnd type="triangle" w="sm" len="lg"/>
-            </a:ln>
-          </p:spPr>
-          <p:style>
-            <a:lnRef idx="1">
-              <a:schemeClr val="accent1"/>
-            </a:lnRef>
-            <a:fillRef idx="0">
-              <a:schemeClr val="accent1"/>
-            </a:fillRef>
-            <a:effectRef idx="0">
-              <a:schemeClr val="accent1"/>
-            </a:effectRef>
-            <a:fontRef idx="minor">
-              <a:schemeClr val="tx1"/>
-            </a:fontRef>
-          </p:style>
-        </p:cxnSp>
-        <p:cxnSp>
-          <p:nvCxnSpPr>
-            <p:cNvPr id="37" name="Connecteur droit avec flèche 36"/>
-            <p:cNvCxnSpPr/>
-            <p:nvPr/>
-          </p:nvCxnSpPr>
-          <p:spPr>
-            <a:xfrm flipV="1">
-              <a:off x="971600" y="548680"/>
-              <a:ext cx="0" cy="720080"/>
-            </a:xfrm>
-            <a:prstGeom prst="straightConnector1">
-              <a:avLst/>
-            </a:prstGeom>
-            <a:ln w="12700">
-              <a:solidFill>
-                <a:schemeClr val="bg1">
-                  <a:lumMod val="50000"/>
-                </a:schemeClr>
-              </a:solidFill>
-              <a:tailEnd type="triangle" w="sm" len="lg"/>
-            </a:ln>
-          </p:spPr>
-          <p:style>
-            <a:lnRef idx="1">
-              <a:schemeClr val="accent1"/>
-            </a:lnRef>
-            <a:fillRef idx="0">
-              <a:schemeClr val="accent1"/>
-            </a:fillRef>
-            <a:effectRef idx="0">
-              <a:schemeClr val="accent1"/>
-            </a:effectRef>
-            <a:fontRef idx="minor">
-              <a:schemeClr val="tx1"/>
-            </a:fontRef>
-          </p:style>
-        </p:cxnSp>
-      </p:grpSp>
-      <p:grpSp>
-        <p:nvGrpSpPr>
-          <p:cNvPr id="38" name="Groupe 37"/>
-          <p:cNvGrpSpPr/>
-          <p:nvPr/>
-        </p:nvGrpSpPr>
-        <p:grpSpPr>
-          <a:xfrm rot="20700000">
-            <a:off x="5179262" y="465959"/>
-            <a:ext cx="734014" cy="720080"/>
-            <a:chOff x="971600" y="548680"/>
-            <a:chExt cx="734014" cy="720080"/>
-          </a:xfrm>
-        </p:grpSpPr>
-        <p:cxnSp>
-          <p:nvCxnSpPr>
-            <p:cNvPr id="39" name="Connecteur droit avec flèche 38"/>
-            <p:cNvCxnSpPr/>
-            <p:nvPr/>
-          </p:nvCxnSpPr>
-          <p:spPr>
-            <a:xfrm>
-              <a:off x="971600" y="1268760"/>
-              <a:ext cx="734014" cy="0"/>
-            </a:xfrm>
-            <a:prstGeom prst="straightConnector1">
-              <a:avLst/>
-            </a:prstGeom>
-            <a:ln w="12700">
-              <a:solidFill>
-                <a:srgbClr val="FF0000"/>
-              </a:solidFill>
-              <a:tailEnd type="triangle" w="sm" len="lg"/>
-            </a:ln>
-          </p:spPr>
-          <p:style>
-            <a:lnRef idx="1">
-              <a:schemeClr val="accent1"/>
-            </a:lnRef>
-            <a:fillRef idx="0">
-              <a:schemeClr val="accent1"/>
-            </a:fillRef>
-            <a:effectRef idx="0">
-              <a:schemeClr val="accent1"/>
-            </a:effectRef>
-            <a:fontRef idx="minor">
-              <a:schemeClr val="tx1"/>
-            </a:fontRef>
-          </p:style>
-        </p:cxnSp>
-        <p:cxnSp>
-          <p:nvCxnSpPr>
-            <p:cNvPr id="40" name="Connecteur droit avec flèche 39"/>
-            <p:cNvCxnSpPr/>
-            <p:nvPr/>
-          </p:nvCxnSpPr>
-          <p:spPr>
-            <a:xfrm flipV="1">
-              <a:off x="971600" y="548680"/>
-              <a:ext cx="0" cy="720080"/>
-            </a:xfrm>
-            <a:prstGeom prst="straightConnector1">
-              <a:avLst/>
-            </a:prstGeom>
-            <a:ln w="12700">
-              <a:solidFill>
-                <a:srgbClr val="FF0000"/>
-              </a:solidFill>
-              <a:tailEnd type="triangle" w="sm" len="lg"/>
-            </a:ln>
-          </p:spPr>
-          <p:style>
-            <a:lnRef idx="1">
-              <a:schemeClr val="accent1"/>
-            </a:lnRef>
-            <a:fillRef idx="0">
-              <a:schemeClr val="accent1"/>
-            </a:fillRef>
-            <a:effectRef idx="0">
-              <a:schemeClr val="accent1"/>
-            </a:effectRef>
-            <a:fontRef idx="minor">
-              <a:schemeClr val="tx1"/>
-            </a:fontRef>
-          </p:style>
-        </p:cxnSp>
-      </p:grpSp>
-      <mc:AlternateContent xmlns:mc="http://schemas.openxmlformats.org/markup-compatibility/2006" xmlns:a14="http://schemas.microsoft.com/office/drawing/2010/main">
-        <mc:Choice Requires="a14">
-          <p:sp>
-            <p:nvSpPr>
-              <p:cNvPr id="41" name="ZoneTexte 40"/>
-              <p:cNvSpPr txBox="1"/>
-              <p:nvPr/>
-            </p:nvSpPr>
-            <p:spPr>
-              <a:xfrm>
-                <a:off x="6013394" y="836712"/>
-                <a:ext cx="362022" cy="276999"/>
-              </a:xfrm>
-              <a:prstGeom prst="rect">
-                <a:avLst/>
-              </a:prstGeom>
-              <a:noFill/>
-            </p:spPr>
-            <p:txBody>
-              <a:bodyPr wrap="none" rtlCol="0">
-                <a:spAutoFit/>
-              </a:bodyPr>
-              <a:lstStyle/>
-              <a:p>
-                <a:pPr/>
-                <a14:m>
-                  <m:oMathPara xmlns:m="http://schemas.openxmlformats.org/officeDocument/2006/math">
-                    <m:oMathParaPr>
-                      <m:jc m:val="centerGroup"/>
-                    </m:oMathParaPr>
-                    <m:oMath xmlns:m="http://schemas.openxmlformats.org/officeDocument/2006/math">
-                      <m:acc>
-                        <m:accPr>
-                          <m:chr m:val="⃗"/>
-                          <m:ctrlPr>
-                            <a:rPr lang="fr-FR" sz="1200" i="1" smtClean="0">
-                              <a:latin typeface="Cambria Math"/>
-                            </a:rPr>
-                          </m:ctrlPr>
-                        </m:accPr>
-                        <m:e>
-                          <m:sSub>
-                            <m:sSubPr>
-                              <m:ctrlPr>
-                                <a:rPr lang="fr-FR" sz="1200" i="1" smtClean="0">
-                                  <a:latin typeface="Cambria Math"/>
-                                </a:rPr>
-                              </m:ctrlPr>
-                            </m:sSubPr>
-                            <m:e>
-                              <m:r>
-                                <a:rPr lang="fr-FR" sz="1200" b="0" i="1" smtClean="0">
-                                  <a:latin typeface="Cambria Math"/>
-                                </a:rPr>
-                                <m:t>𝑧</m:t>
-                              </m:r>
-                            </m:e>
-                            <m:sub>
-                              <m:r>
-                                <a:rPr lang="fr-FR" sz="1200" b="0" i="1" smtClean="0">
-                                  <a:latin typeface="Cambria Math"/>
-                                </a:rPr>
-                                <m:t>4</m:t>
-                              </m:r>
-                            </m:sub>
-                          </m:sSub>
-                        </m:e>
-                      </m:acc>
-                    </m:oMath>
-                  </m:oMathPara>
-                </a14:m>
-                <a:endParaRPr lang="fr-FR" sz="1200" dirty="0"/>
-              </a:p>
-            </p:txBody>
-          </p:sp>
-        </mc:Choice>
-        <mc:Fallback xmlns="">
-          <p:sp>
-            <p:nvSpPr>
-              <p:cNvPr id="41" name="ZoneTexte 40"/>
-              <p:cNvSpPr txBox="1">
-                <a:spLocks noRot="1" noChangeAspect="1" noMove="1" noResize="1" noEditPoints="1" noAdjustHandles="1" noChangeArrowheads="1" noChangeShapeType="1" noTextEdit="1"/>
-              </p:cNvSpPr>
-              <p:nvPr/>
-            </p:nvSpPr>
-            <p:spPr>
-              <a:xfrm>
-                <a:off x="6013394" y="836712"/>
-                <a:ext cx="362022" cy="276999"/>
-              </a:xfrm>
-              <a:prstGeom prst="rect">
-                <a:avLst/>
-              </a:prstGeom>
-              <a:blipFill rotWithShape="1">
-                <a:blip r:embed="rId3"/>
-                <a:stretch>
-                  <a:fillRect/>
-                </a:stretch>
-              </a:blipFill>
-            </p:spPr>
-            <p:txBody>
-              <a:bodyPr/>
-              <a:lstStyle/>
-              <a:p>
-                <a:r>
-                  <a:rPr lang="fr-FR">
-                    <a:noFill/>
-                  </a:rPr>
-                  <a:t> </a:t>
-                </a:r>
-              </a:p>
-            </p:txBody>
-          </p:sp>
-        </mc:Fallback>
-      </mc:AlternateContent>
-      <mc:AlternateContent xmlns:mc="http://schemas.openxmlformats.org/markup-compatibility/2006" xmlns:a14="http://schemas.microsoft.com/office/drawing/2010/main">
-        <mc:Choice Requires="a14">
-          <p:sp>
-            <p:nvSpPr>
-              <p:cNvPr id="42" name="ZoneTexte 41"/>
-              <p:cNvSpPr txBox="1"/>
-              <p:nvPr/>
-            </p:nvSpPr>
-            <p:spPr>
-              <a:xfrm>
-                <a:off x="5114730" y="1290070"/>
-                <a:ext cx="722313" cy="276999"/>
-              </a:xfrm>
-              <a:prstGeom prst="rect">
-                <a:avLst/>
-              </a:prstGeom>
-              <a:noFill/>
-            </p:spPr>
-            <p:txBody>
-              <a:bodyPr wrap="none" rtlCol="0">
-                <a:spAutoFit/>
-              </a:bodyPr>
-              <a:lstStyle/>
-              <a:p>
-                <a:pPr/>
-                <a14:m>
-                  <m:oMathPara xmlns:m="http://schemas.openxmlformats.org/officeDocument/2006/math">
-                    <m:oMathParaPr>
-                      <m:jc m:val="centerGroup"/>
-                    </m:oMathParaPr>
-                    <m:oMath xmlns:m="http://schemas.openxmlformats.org/officeDocument/2006/math">
-                      <m:acc>
-                        <m:accPr>
-                          <m:chr m:val="⃗"/>
-                          <m:ctrlPr>
-                            <a:rPr lang="fr-FR" sz="1200" i="1" smtClean="0">
-                              <a:latin typeface="Cambria Math"/>
-                            </a:rPr>
-                          </m:ctrlPr>
-                        </m:accPr>
-                        <m:e>
-                          <m:sSub>
-                            <m:sSubPr>
-                              <m:ctrlPr>
-                                <a:rPr lang="fr-FR" sz="1200" i="1" smtClean="0">
-                                  <a:latin typeface="Cambria Math"/>
-                                </a:rPr>
-                              </m:ctrlPr>
-                            </m:sSubPr>
-                            <m:e>
-                              <m:r>
-                                <a:rPr lang="fr-FR" sz="1200" b="0" i="1" smtClean="0">
-                                  <a:latin typeface="Cambria Math"/>
-                                </a:rPr>
-                                <m:t>𝑦</m:t>
-                              </m:r>
-                            </m:e>
-                            <m:sub>
-                              <m:r>
-                                <a:rPr lang="fr-FR" sz="1200" b="0" i="1" smtClean="0">
-                                  <a:latin typeface="Cambria Math"/>
-                                </a:rPr>
-                                <m:t>0</m:t>
-                              </m:r>
-                            </m:sub>
-                          </m:sSub>
-                        </m:e>
-                      </m:acc>
-                      <m:r>
-                        <a:rPr lang="fr-FR" sz="1200" b="0" i="1" smtClean="0">
-                          <a:latin typeface="Cambria Math"/>
-                        </a:rPr>
-                        <m:t>=</m:t>
-                      </m:r>
-                      <m:acc>
-                        <m:accPr>
-                          <m:chr m:val="⃗"/>
-                          <m:ctrlPr>
-                            <a:rPr lang="fr-FR" sz="1200" b="0" i="1" smtClean="0">
-                              <a:latin typeface="Cambria Math"/>
-                            </a:rPr>
-                          </m:ctrlPr>
-                        </m:accPr>
-                        <m:e>
-                          <m:sSub>
-                            <m:sSubPr>
-                              <m:ctrlPr>
-                                <a:rPr lang="fr-FR" sz="1200" b="0" i="1" smtClean="0">
-                                  <a:latin typeface="Cambria Math"/>
-                                </a:rPr>
-                              </m:ctrlPr>
-                            </m:sSubPr>
-                            <m:e>
-                              <m:r>
-                                <a:rPr lang="fr-FR" sz="1200" b="0" i="1" smtClean="0">
-                                  <a:latin typeface="Cambria Math"/>
-                                </a:rPr>
-                                <m:t>𝑦</m:t>
-                              </m:r>
-                            </m:e>
-                            <m:sub>
-                              <m:r>
-                                <a:rPr lang="fr-FR" sz="1200" b="0" i="1" smtClean="0">
-                                  <a:latin typeface="Cambria Math"/>
-                                </a:rPr>
-                                <m:t>4</m:t>
-                              </m:r>
-                            </m:sub>
-                          </m:sSub>
-                        </m:e>
-                      </m:acc>
-                    </m:oMath>
-                  </m:oMathPara>
-                </a14:m>
-                <a:endParaRPr lang="fr-FR" sz="1200" dirty="0"/>
-              </a:p>
-            </p:txBody>
-          </p:sp>
-        </mc:Choice>
-        <mc:Fallback xmlns="">
-          <p:sp>
-            <p:nvSpPr>
-              <p:cNvPr id="42" name="ZoneTexte 41"/>
-              <p:cNvSpPr txBox="1">
-                <a:spLocks noRot="1" noChangeAspect="1" noMove="1" noResize="1" noEditPoints="1" noAdjustHandles="1" noChangeArrowheads="1" noChangeShapeType="1" noTextEdit="1"/>
-              </p:cNvSpPr>
-              <p:nvPr/>
-            </p:nvSpPr>
-            <p:spPr>
-              <a:xfrm>
-                <a:off x="5114730" y="1290070"/>
-                <a:ext cx="722313" cy="276999"/>
-              </a:xfrm>
-              <a:prstGeom prst="rect">
-                <a:avLst/>
-              </a:prstGeom>
-              <a:blipFill rotWithShape="1">
-                <a:blip r:embed="rId4"/>
-                <a:stretch>
-                  <a:fillRect/>
-                </a:stretch>
-              </a:blipFill>
-            </p:spPr>
-            <p:txBody>
-              <a:bodyPr/>
-              <a:lstStyle/>
-              <a:p>
-                <a:r>
-                  <a:rPr lang="fr-FR">
-                    <a:noFill/>
-                  </a:rPr>
-                  <a:t> </a:t>
-                </a:r>
-              </a:p>
-            </p:txBody>
-          </p:sp>
-        </mc:Fallback>
-      </mc:AlternateContent>
-      <mc:AlternateContent xmlns:mc="http://schemas.openxmlformats.org/markup-compatibility/2006" xmlns:a14="http://schemas.microsoft.com/office/drawing/2010/main">
-        <mc:Choice Requires="a14">
-          <p:sp>
-            <p:nvSpPr>
-              <p:cNvPr id="43" name="ZoneTexte 42"/>
-              <p:cNvSpPr txBox="1"/>
-              <p:nvPr/>
-            </p:nvSpPr>
-            <p:spPr>
-              <a:xfrm>
-                <a:off x="4821409" y="271679"/>
-                <a:ext cx="372345" cy="276999"/>
-              </a:xfrm>
-              <a:prstGeom prst="rect">
-                <a:avLst/>
-              </a:prstGeom>
-              <a:noFill/>
-            </p:spPr>
-            <p:txBody>
-              <a:bodyPr wrap="none" rtlCol="0">
-                <a:spAutoFit/>
-              </a:bodyPr>
-              <a:lstStyle/>
-              <a:p>
-                <a:pPr/>
-                <a14:m>
-                  <m:oMathPara xmlns:m="http://schemas.openxmlformats.org/officeDocument/2006/math">
-                    <m:oMathParaPr>
-                      <m:jc m:val="centerGroup"/>
-                    </m:oMathParaPr>
-                    <m:oMath xmlns:m="http://schemas.openxmlformats.org/officeDocument/2006/math">
-                      <m:acc>
-                        <m:accPr>
-                          <m:chr m:val="⃗"/>
-                          <m:ctrlPr>
-                            <a:rPr lang="fr-FR" sz="1200" i="1" smtClean="0">
-                              <a:latin typeface="Cambria Math"/>
-                            </a:rPr>
-                          </m:ctrlPr>
-                        </m:accPr>
-                        <m:e>
-                          <m:sSub>
-                            <m:sSubPr>
-                              <m:ctrlPr>
-                                <a:rPr lang="fr-FR" sz="1200" b="0" i="1" smtClean="0">
-                                  <a:latin typeface="Cambria Math"/>
-                                </a:rPr>
-                              </m:ctrlPr>
-                            </m:sSubPr>
-                            <m:e>
-                              <m:r>
-                                <a:rPr lang="fr-FR" sz="1200" i="1" smtClean="0">
-                                  <a:latin typeface="Cambria Math"/>
-                                </a:rPr>
-                                <m:t>𝑥</m:t>
-                              </m:r>
-                            </m:e>
-                            <m:sub>
-                              <m:r>
-                                <a:rPr lang="fr-FR" sz="1200" b="0" i="1" smtClean="0">
-                                  <a:latin typeface="Cambria Math"/>
-                                </a:rPr>
-                                <m:t>4</m:t>
-                              </m:r>
-                            </m:sub>
-                          </m:sSub>
-                        </m:e>
-                      </m:acc>
-                    </m:oMath>
-                  </m:oMathPara>
-                </a14:m>
-                <a:endParaRPr lang="fr-FR" sz="1200" dirty="0"/>
-              </a:p>
-            </p:txBody>
-          </p:sp>
-        </mc:Choice>
-        <mc:Fallback xmlns="">
-          <p:sp>
-            <p:nvSpPr>
-              <p:cNvPr id="43" name="ZoneTexte 42"/>
-              <p:cNvSpPr txBox="1">
-                <a:spLocks noRot="1" noChangeAspect="1" noMove="1" noResize="1" noEditPoints="1" noAdjustHandles="1" noChangeArrowheads="1" noChangeShapeType="1" noTextEdit="1"/>
-              </p:cNvSpPr>
-              <p:nvPr/>
-            </p:nvSpPr>
-            <p:spPr>
-              <a:xfrm>
-                <a:off x="4821409" y="271679"/>
-                <a:ext cx="372345" cy="276999"/>
-              </a:xfrm>
-              <a:prstGeom prst="rect">
-                <a:avLst/>
-              </a:prstGeom>
-              <a:blipFill rotWithShape="1">
-                <a:blip r:embed="rId5"/>
-                <a:stretch>
-                  <a:fillRect/>
-                </a:stretch>
-              </a:blipFill>
-            </p:spPr>
-            <p:txBody>
-              <a:bodyPr/>
-              <a:lstStyle/>
-              <a:p>
-                <a:r>
-                  <a:rPr lang="fr-FR">
-                    <a:noFill/>
-                  </a:rPr>
-                  <a:t> </a:t>
-                </a:r>
-              </a:p>
-            </p:txBody>
-          </p:sp>
-        </mc:Fallback>
-      </mc:AlternateContent>
-      <p:sp>
-        <p:nvSpPr>
-          <p:cNvPr id="47" name="Arc 46"/>
-          <p:cNvSpPr/>
-          <p:nvPr/>
-        </p:nvSpPr>
-        <p:spPr>
-          <a:xfrm>
-            <a:off x="4731516" y="687180"/>
-            <a:ext cx="1113326" cy="1163158"/>
-          </a:xfrm>
-          <a:prstGeom prst="arc">
-            <a:avLst>
-              <a:gd name="adj1" fmla="val 20757849"/>
-              <a:gd name="adj2" fmla="val 21565869"/>
-            </a:avLst>
-          </a:prstGeom>
-          <a:ln>
-            <a:headEnd type="stealth" w="sm" len="med"/>
-            <a:tailEnd type="none" w="med" len="med"/>
-          </a:ln>
-        </p:spPr>
-        <p:style>
-          <a:lnRef idx="1">
-            <a:schemeClr val="accent1"/>
-          </a:lnRef>
-          <a:fillRef idx="0">
-            <a:schemeClr val="accent1"/>
-          </a:fillRef>
-          <a:effectRef idx="0">
-            <a:schemeClr val="accent1"/>
-          </a:effectRef>
-          <a:fontRef idx="minor">
-            <a:schemeClr val="tx1"/>
-          </a:fontRef>
-        </p:style>
-        <p:txBody>
-          <a:bodyPr rtlCol="0" anchor="ctr"/>
-          <a:lstStyle/>
-          <a:p>
-            <a:pPr algn="ctr"/>
-            <a:endParaRPr lang="fr-FR"/>
-          </a:p>
-        </p:txBody>
-      </p:sp>
-      <mc:AlternateContent xmlns:mc="http://schemas.openxmlformats.org/markup-compatibility/2006" xmlns:a14="http://schemas.microsoft.com/office/drawing/2010/main">
-        <mc:Choice Requires="a14">
-          <p:sp>
-            <p:nvSpPr>
-              <p:cNvPr id="51" name="ZoneTexte 50"/>
-              <p:cNvSpPr txBox="1"/>
-              <p:nvPr/>
-            </p:nvSpPr>
-            <p:spPr>
-              <a:xfrm>
-                <a:off x="5867535" y="1026535"/>
-                <a:ext cx="502253" cy="276999"/>
-              </a:xfrm>
-              <a:prstGeom prst="rect">
-                <a:avLst/>
-              </a:prstGeom>
-              <a:noFill/>
-            </p:spPr>
-            <p:txBody>
-              <a:bodyPr wrap="none" rtlCol="0">
-                <a:spAutoFit/>
-              </a:bodyPr>
-              <a:lstStyle/>
-              <a:p>
-                <a:pPr/>
-                <a14:m>
-                  <m:oMathPara xmlns:m="http://schemas.openxmlformats.org/officeDocument/2006/math">
-                    <m:oMathParaPr>
-                      <m:jc m:val="centerGroup"/>
-                    </m:oMathParaPr>
-                    <m:oMath xmlns:m="http://schemas.openxmlformats.org/officeDocument/2006/math">
-                      <m:r>
-                        <a:rPr lang="fr-FR" sz="1200" b="0" i="1" smtClean="0">
-                          <a:latin typeface="Cambria Math"/>
-                        </a:rPr>
-                        <m:t>𝛿</m:t>
-                      </m:r>
-                      <m:r>
-                        <a:rPr lang="fr-FR" sz="1200" b="0" i="1" smtClean="0">
-                          <a:latin typeface="Cambria Math"/>
-                        </a:rPr>
-                        <m:t>(</m:t>
-                      </m:r>
-                      <m:r>
-                        <a:rPr lang="fr-FR" sz="1200" b="0" i="1" smtClean="0">
-                          <a:latin typeface="Cambria Math"/>
-                        </a:rPr>
-                        <m:t>𝑡</m:t>
-                      </m:r>
-                      <m:r>
-                        <a:rPr lang="fr-FR" sz="1200" b="0" i="1" smtClean="0">
-                          <a:latin typeface="Cambria Math"/>
-                        </a:rPr>
-                        <m:t>)</m:t>
-                      </m:r>
-                    </m:oMath>
-                  </m:oMathPara>
-                </a14:m>
-                <a:endParaRPr lang="fr-FR" sz="1200" dirty="0"/>
-              </a:p>
-            </p:txBody>
-          </p:sp>
-        </mc:Choice>
-        <mc:Fallback xmlns="">
-          <p:sp>
-            <p:nvSpPr>
-              <p:cNvPr id="51" name="ZoneTexte 50"/>
-              <p:cNvSpPr txBox="1">
-                <a:spLocks noRot="1" noChangeAspect="1" noMove="1" noResize="1" noEditPoints="1" noAdjustHandles="1" noChangeArrowheads="1" noChangeShapeType="1" noTextEdit="1"/>
-              </p:cNvSpPr>
-              <p:nvPr/>
-            </p:nvSpPr>
-            <p:spPr>
-              <a:xfrm>
-                <a:off x="5867535" y="1026535"/>
-                <a:ext cx="502253" cy="276999"/>
-              </a:xfrm>
-              <a:prstGeom prst="rect">
-                <a:avLst/>
-              </a:prstGeom>
-              <a:blipFill rotWithShape="1">
-                <a:blip r:embed="rId6"/>
-                <a:stretch>
-                  <a:fillRect b="-6522"/>
-                </a:stretch>
-              </a:blipFill>
-            </p:spPr>
-            <p:txBody>
-              <a:bodyPr/>
-              <a:lstStyle/>
-              <a:p>
-                <a:r>
-                  <a:rPr lang="fr-FR">
-                    <a:noFill/>
-                  </a:rPr>
-                  <a:t> </a:t>
-                </a:r>
-              </a:p>
-            </p:txBody>
-          </p:sp>
-        </mc:Fallback>
-      </mc:AlternateContent>
-      <mc:AlternateContent xmlns:mc="http://schemas.openxmlformats.org/markup-compatibility/2006" xmlns:a14="http://schemas.microsoft.com/office/drawing/2010/main">
-        <mc:Choice Requires="a14">
-          <p:sp>
-            <p:nvSpPr>
-              <p:cNvPr id="52" name="ZoneTexte 51"/>
-              <p:cNvSpPr txBox="1"/>
-              <p:nvPr/>
-            </p:nvSpPr>
-            <p:spPr>
-              <a:xfrm>
-                <a:off x="5114730" y="1545758"/>
-                <a:ext cx="1255058" cy="300595"/>
-              </a:xfrm>
-              <a:prstGeom prst="rect">
-                <a:avLst/>
-              </a:prstGeom>
-              <a:noFill/>
-            </p:spPr>
-            <p:txBody>
-              <a:bodyPr wrap="square" rtlCol="0">
-                <a:spAutoFit/>
-              </a:bodyPr>
-              <a:lstStyle/>
-              <a:p>
-                <a:pPr/>
-                <a14:m>
-                  <m:oMathPara xmlns:m="http://schemas.openxmlformats.org/officeDocument/2006/math">
-                    <m:oMathParaPr>
-                      <m:jc m:val="centerGroup"/>
-                    </m:oMathParaPr>
-                    <m:oMath xmlns:m="http://schemas.openxmlformats.org/officeDocument/2006/math">
-                      <m:acc>
-                        <m:accPr>
-                          <m:chr m:val="⃗"/>
-                          <m:ctrlPr>
-                            <a:rPr lang="fr-FR" sz="1200" i="1" smtClean="0">
-                              <a:latin typeface="Cambria Math"/>
-                            </a:rPr>
-                          </m:ctrlPr>
-                        </m:accPr>
-                        <m:e>
-                          <m:sSub>
-                            <m:sSubPr>
-                              <m:ctrlPr>
-                                <a:rPr lang="fr-FR" sz="1200" b="0" i="1" smtClean="0">
-                                  <a:latin typeface="Cambria Math"/>
-                                </a:rPr>
-                              </m:ctrlPr>
-                            </m:sSubPr>
-                            <m:e>
-                              <m:r>
-                                <a:rPr lang="fr-FR" sz="1200" b="0" i="1" smtClean="0">
-                                  <a:latin typeface="Cambria Math"/>
-                                </a:rPr>
-                                <m:t>𝑂</m:t>
-                              </m:r>
-                            </m:e>
-                            <m:sub>
-                              <m:r>
-                                <a:rPr lang="fr-FR" sz="1200" b="0" i="1" smtClean="0">
-                                  <a:latin typeface="Cambria Math"/>
-                                </a:rPr>
-                                <m:t>3</m:t>
-                              </m:r>
-                            </m:sub>
-                          </m:sSub>
-                          <m:r>
-                            <a:rPr lang="fr-FR" sz="1200" b="0" i="1" smtClean="0">
-                              <a:latin typeface="Cambria Math"/>
-                            </a:rPr>
-                            <m:t>𝐴</m:t>
-                          </m:r>
-                        </m:e>
-                      </m:acc>
-                      <m:r>
-                        <a:rPr lang="fr-FR" sz="1200" b="0" i="1" smtClean="0">
-                          <a:latin typeface="Cambria Math"/>
-                        </a:rPr>
-                        <m:t>=</m:t>
-                      </m:r>
-                      <m:r>
-                        <a:rPr lang="fr-FR" sz="1200" b="0" i="1" smtClean="0">
-                          <a:latin typeface="Cambria Math"/>
-                        </a:rPr>
-                        <m:t>𝜆</m:t>
-                      </m:r>
-                      <m:d>
-                        <m:dPr>
-                          <m:ctrlPr>
-                            <a:rPr lang="fr-FR" sz="1200" b="0" i="1" smtClean="0">
-                              <a:latin typeface="Cambria Math"/>
-                            </a:rPr>
-                          </m:ctrlPr>
-                        </m:dPr>
-                        <m:e>
-                          <m:r>
-                            <a:rPr lang="fr-FR" sz="1200" b="0" i="1" smtClean="0">
-                              <a:latin typeface="Cambria Math"/>
-                            </a:rPr>
-                            <m:t>𝑡</m:t>
-                          </m:r>
-                        </m:e>
-                      </m:d>
-                      <m:r>
-                        <a:rPr lang="fr-FR" sz="1200" b="0" i="1" smtClean="0">
-                          <a:latin typeface="Cambria Math"/>
-                        </a:rPr>
-                        <m:t> </m:t>
-                      </m:r>
-                      <m:acc>
-                        <m:accPr>
-                          <m:chr m:val="⃗"/>
-                          <m:ctrlPr>
-                            <a:rPr lang="fr-FR" sz="1200" b="0" i="1" smtClean="0">
-                              <a:latin typeface="Cambria Math"/>
-                            </a:rPr>
-                          </m:ctrlPr>
-                        </m:accPr>
-                        <m:e>
-                          <m:sSub>
-                            <m:sSubPr>
-                              <m:ctrlPr>
-                                <a:rPr lang="fr-FR" sz="1200" b="0" i="1" smtClean="0">
-                                  <a:latin typeface="Cambria Math"/>
-                                </a:rPr>
-                              </m:ctrlPr>
-                            </m:sSubPr>
-                            <m:e>
-                              <m:r>
-                                <a:rPr lang="fr-FR" sz="1200" b="0" i="1" smtClean="0">
-                                  <a:latin typeface="Cambria Math"/>
-                                </a:rPr>
-                                <m:t>𝑦</m:t>
-                              </m:r>
-                            </m:e>
-                            <m:sub>
-                              <m:r>
-                                <a:rPr lang="fr-FR" sz="1200" b="0" i="1" smtClean="0">
-                                  <a:latin typeface="Cambria Math"/>
-                                </a:rPr>
-                                <m:t>0</m:t>
-                              </m:r>
-                            </m:sub>
-                          </m:sSub>
-                        </m:e>
-                      </m:acc>
-                    </m:oMath>
-                  </m:oMathPara>
-                </a14:m>
-                <a:endParaRPr lang="fr-FR" sz="1200" dirty="0"/>
-              </a:p>
-            </p:txBody>
-          </p:sp>
-        </mc:Choice>
-        <mc:Fallback xmlns="">
-          <p:sp>
-            <p:nvSpPr>
-              <p:cNvPr id="52" name="ZoneTexte 51"/>
-              <p:cNvSpPr txBox="1">
-                <a:spLocks noRot="1" noChangeAspect="1" noMove="1" noResize="1" noEditPoints="1" noAdjustHandles="1" noChangeArrowheads="1" noChangeShapeType="1" noTextEdit="1"/>
-              </p:cNvSpPr>
-              <p:nvPr/>
-            </p:nvSpPr>
-            <p:spPr>
-              <a:xfrm>
-                <a:off x="5114730" y="1545758"/>
-                <a:ext cx="1255058" cy="300595"/>
-              </a:xfrm>
-              <a:prstGeom prst="rect">
-                <a:avLst/>
-              </a:prstGeom>
-              <a:blipFill rotWithShape="1">
-                <a:blip r:embed="rId7"/>
-                <a:stretch>
-                  <a:fillRect/>
-                </a:stretch>
-              </a:blipFill>
-            </p:spPr>
-            <p:txBody>
-              <a:bodyPr/>
-              <a:lstStyle/>
-              <a:p>
-                <a:r>
-                  <a:rPr lang="fr-FR">
-                    <a:noFill/>
-                  </a:rPr>
-                  <a:t> </a:t>
-                </a:r>
-              </a:p>
-            </p:txBody>
-          </p:sp>
-        </mc:Fallback>
-      </mc:AlternateContent>
-      <mc:AlternateContent xmlns:mc="http://schemas.openxmlformats.org/markup-compatibility/2006" xmlns:a14="http://schemas.microsoft.com/office/drawing/2010/main">
-        <mc:Choice Requires="a14">
-          <p:sp>
-            <p:nvSpPr>
-              <p:cNvPr id="56" name="ZoneTexte 55"/>
-              <p:cNvSpPr txBox="1"/>
-              <p:nvPr/>
-            </p:nvSpPr>
-            <p:spPr>
-              <a:xfrm>
-                <a:off x="5121335" y="273513"/>
-                <a:ext cx="372345" cy="276999"/>
-              </a:xfrm>
-              <a:prstGeom prst="rect">
-                <a:avLst/>
-              </a:prstGeom>
-              <a:noFill/>
-            </p:spPr>
-            <p:txBody>
-              <a:bodyPr wrap="none" rtlCol="0">
-                <a:spAutoFit/>
-              </a:bodyPr>
-              <a:lstStyle/>
-              <a:p>
-                <a:pPr/>
-                <a14:m>
-                  <m:oMathPara xmlns:m="http://schemas.openxmlformats.org/officeDocument/2006/math">
-                    <m:oMathParaPr>
-                      <m:jc m:val="centerGroup"/>
-                    </m:oMathParaPr>
-                    <m:oMath xmlns:m="http://schemas.openxmlformats.org/officeDocument/2006/math">
-                      <m:acc>
-                        <m:accPr>
-                          <m:chr m:val="⃗"/>
-                          <m:ctrlPr>
-                            <a:rPr lang="fr-FR" sz="1200" i="1" smtClean="0">
-                              <a:latin typeface="Cambria Math"/>
-                            </a:rPr>
-                          </m:ctrlPr>
-                        </m:accPr>
-                        <m:e>
-                          <m:sSub>
-                            <m:sSubPr>
-                              <m:ctrlPr>
-                                <a:rPr lang="fr-FR" sz="1200" b="0" i="1" smtClean="0">
-                                  <a:latin typeface="Cambria Math"/>
-                                </a:rPr>
-                              </m:ctrlPr>
-                            </m:sSubPr>
-                            <m:e>
-                              <m:r>
-                                <a:rPr lang="fr-FR" sz="1200" i="1" smtClean="0">
-                                  <a:latin typeface="Cambria Math"/>
-                                </a:rPr>
-                                <m:t>𝑥</m:t>
-                              </m:r>
-                            </m:e>
-                            <m:sub>
-                              <m:r>
-                                <a:rPr lang="fr-FR" sz="1200" b="0" i="1" smtClean="0">
-                                  <a:latin typeface="Cambria Math"/>
-                                </a:rPr>
-                                <m:t>0</m:t>
-                              </m:r>
-                            </m:sub>
-                          </m:sSub>
-                        </m:e>
-                      </m:acc>
-                    </m:oMath>
-                  </m:oMathPara>
-                </a14:m>
-                <a:endParaRPr lang="fr-FR" sz="1200" dirty="0"/>
-              </a:p>
-            </p:txBody>
-          </p:sp>
-        </mc:Choice>
-        <mc:Fallback xmlns="">
-          <p:sp>
-            <p:nvSpPr>
-              <p:cNvPr id="56" name="ZoneTexte 55"/>
-              <p:cNvSpPr txBox="1">
-                <a:spLocks noRot="1" noChangeAspect="1" noMove="1" noResize="1" noEditPoints="1" noAdjustHandles="1" noChangeArrowheads="1" noChangeShapeType="1" noTextEdit="1"/>
-              </p:cNvSpPr>
-              <p:nvPr/>
-            </p:nvSpPr>
-            <p:spPr>
-              <a:xfrm>
-                <a:off x="5121335" y="273513"/>
-                <a:ext cx="372345" cy="276999"/>
-              </a:xfrm>
-              <a:prstGeom prst="rect">
-                <a:avLst/>
-              </a:prstGeom>
-              <a:blipFill rotWithShape="1">
-                <a:blip r:embed="rId8"/>
-                <a:stretch>
-                  <a:fillRect/>
-                </a:stretch>
-              </a:blipFill>
-            </p:spPr>
-            <p:txBody>
-              <a:bodyPr/>
-              <a:lstStyle/>
-              <a:p>
-                <a:r>
-                  <a:rPr lang="fr-FR">
-                    <a:noFill/>
-                  </a:rPr>
-                  <a:t> </a:t>
-                </a:r>
-              </a:p>
-            </p:txBody>
-          </p:sp>
-        </mc:Fallback>
-      </mc:AlternateContent>
-    </p:spTree>
-    <p:extLst>
-      <p:ext uri="{BB962C8B-B14F-4D97-AF65-F5344CB8AC3E}">
-        <p14:creationId xmlns:p14="http://schemas.microsoft.com/office/powerpoint/2010/main" val="1228224438"/>
-      </p:ext>
-    </p:extLst>
-  </p:cSld>
-  <p:clrMapOvr>
-    <a:masterClrMapping/>
-  </p:clrMapOvr>
-</p:sld>
-</file>
-
 <file path=ppt/theme/theme1.xml><?xml version="1.0" encoding="utf-8"?>
 <a:theme xmlns:a="http://schemas.openxmlformats.org/drawingml/2006/main" name="Thème Office">
   <a:themeElements>

</xml_diff>